<commit_message>
model selection slide updates
</commit_message>
<xml_diff>
--- a/09 - Performance and Evaluation Pt 3/FALL 2021 - ML in Practice and Model Selection III.pptx
+++ b/09 - Performance and Evaluation Pt 3/FALL 2021 - ML in Practice and Model Selection III.pptx
@@ -6,7 +6,7 @@
     <p:sldMasterId id="2147483672" r:id="rId2"/>
   </p:sldMasterIdLst>
   <p:notesMasterIdLst>
-    <p:notesMasterId r:id="rId59"/>
+    <p:notesMasterId r:id="rId61"/>
   </p:notesMasterIdLst>
   <p:sldIdLst>
     <p:sldId id="256" r:id="rId3"/>
@@ -18,53 +18,55 @@
     <p:sldId id="507" r:id="rId9"/>
     <p:sldId id="434" r:id="rId10"/>
     <p:sldId id="508" r:id="rId11"/>
-    <p:sldId id="510" r:id="rId12"/>
-    <p:sldId id="323" r:id="rId13"/>
-    <p:sldId id="511" r:id="rId14"/>
-    <p:sldId id="287" r:id="rId15"/>
-    <p:sldId id="512" r:id="rId16"/>
-    <p:sldId id="463" r:id="rId17"/>
-    <p:sldId id="464" r:id="rId18"/>
-    <p:sldId id="284" r:id="rId19"/>
-    <p:sldId id="474" r:id="rId20"/>
-    <p:sldId id="475" r:id="rId21"/>
-    <p:sldId id="476" r:id="rId22"/>
-    <p:sldId id="477" r:id="rId23"/>
-    <p:sldId id="478" r:id="rId24"/>
-    <p:sldId id="486" r:id="rId25"/>
-    <p:sldId id="484" r:id="rId26"/>
-    <p:sldId id="488" r:id="rId27"/>
-    <p:sldId id="489" r:id="rId28"/>
-    <p:sldId id="490" r:id="rId29"/>
-    <p:sldId id="491" r:id="rId30"/>
-    <p:sldId id="492" r:id="rId31"/>
-    <p:sldId id="493" r:id="rId32"/>
-    <p:sldId id="494" r:id="rId33"/>
-    <p:sldId id="495" r:id="rId34"/>
-    <p:sldId id="487" r:id="rId35"/>
-    <p:sldId id="485" r:id="rId36"/>
-    <p:sldId id="496" r:id="rId37"/>
-    <p:sldId id="514" r:id="rId38"/>
-    <p:sldId id="473" r:id="rId39"/>
-    <p:sldId id="479" r:id="rId40"/>
-    <p:sldId id="481" r:id="rId41"/>
-    <p:sldId id="480" r:id="rId42"/>
-    <p:sldId id="482" r:id="rId43"/>
-    <p:sldId id="501" r:id="rId44"/>
-    <p:sldId id="263" r:id="rId45"/>
-    <p:sldId id="296" r:id="rId46"/>
-    <p:sldId id="260" r:id="rId47"/>
-    <p:sldId id="502" r:id="rId48"/>
-    <p:sldId id="431" r:id="rId49"/>
-    <p:sldId id="309" r:id="rId50"/>
-    <p:sldId id="325" r:id="rId51"/>
-    <p:sldId id="457" r:id="rId52"/>
-    <p:sldId id="428" r:id="rId53"/>
-    <p:sldId id="297" r:id="rId54"/>
-    <p:sldId id="503" r:id="rId55"/>
-    <p:sldId id="454" r:id="rId56"/>
-    <p:sldId id="472" r:id="rId57"/>
-    <p:sldId id="513" r:id="rId58"/>
+    <p:sldId id="515" r:id="rId12"/>
+    <p:sldId id="510" r:id="rId13"/>
+    <p:sldId id="323" r:id="rId14"/>
+    <p:sldId id="511" r:id="rId15"/>
+    <p:sldId id="287" r:id="rId16"/>
+    <p:sldId id="512" r:id="rId17"/>
+    <p:sldId id="463" r:id="rId18"/>
+    <p:sldId id="464" r:id="rId19"/>
+    <p:sldId id="284" r:id="rId20"/>
+    <p:sldId id="474" r:id="rId21"/>
+    <p:sldId id="475" r:id="rId22"/>
+    <p:sldId id="476" r:id="rId23"/>
+    <p:sldId id="477" r:id="rId24"/>
+    <p:sldId id="478" r:id="rId25"/>
+    <p:sldId id="486" r:id="rId26"/>
+    <p:sldId id="484" r:id="rId27"/>
+    <p:sldId id="488" r:id="rId28"/>
+    <p:sldId id="489" r:id="rId29"/>
+    <p:sldId id="490" r:id="rId30"/>
+    <p:sldId id="491" r:id="rId31"/>
+    <p:sldId id="492" r:id="rId32"/>
+    <p:sldId id="493" r:id="rId33"/>
+    <p:sldId id="494" r:id="rId34"/>
+    <p:sldId id="495" r:id="rId35"/>
+    <p:sldId id="487" r:id="rId36"/>
+    <p:sldId id="485" r:id="rId37"/>
+    <p:sldId id="496" r:id="rId38"/>
+    <p:sldId id="514" r:id="rId39"/>
+    <p:sldId id="473" r:id="rId40"/>
+    <p:sldId id="479" r:id="rId41"/>
+    <p:sldId id="481" r:id="rId42"/>
+    <p:sldId id="480" r:id="rId43"/>
+    <p:sldId id="482" r:id="rId44"/>
+    <p:sldId id="501" r:id="rId45"/>
+    <p:sldId id="263" r:id="rId46"/>
+    <p:sldId id="296" r:id="rId47"/>
+    <p:sldId id="260" r:id="rId48"/>
+    <p:sldId id="502" r:id="rId49"/>
+    <p:sldId id="431" r:id="rId50"/>
+    <p:sldId id="309" r:id="rId51"/>
+    <p:sldId id="325" r:id="rId52"/>
+    <p:sldId id="457" r:id="rId53"/>
+    <p:sldId id="428" r:id="rId54"/>
+    <p:sldId id="297" r:id="rId55"/>
+    <p:sldId id="503" r:id="rId56"/>
+    <p:sldId id="454" r:id="rId57"/>
+    <p:sldId id="472" r:id="rId58"/>
+    <p:sldId id="516" r:id="rId59"/>
+    <p:sldId id="513" r:id="rId60"/>
   </p:sldIdLst>
   <p:sldSz cx="12192000" cy="6858000"/>
   <p:notesSz cx="6858000" cy="9144000"/>
@@ -302,7 +304,7 @@
       <p15:sldGuideLst xmlns:p15="http://schemas.microsoft.com/office/powerpoint/2012/main"/>
     </p:ext>
     <p:ext uri="http://customooxmlschemas.google.com/">
-      <go:slidesCustomData xmlns="" xmlns:mc="http://schemas.openxmlformats.org/markup-compatibility/2006" xmlns:mv="urn:schemas-microsoft-com:mac:vml" xmlns:c="http://schemas.openxmlformats.org/drawingml/2006/chart" xmlns:dgm="http://schemas.openxmlformats.org/drawingml/2006/diagram" xmlns:o="urn:schemas-microsoft-com:office:office" xmlns:v="urn:schemas-microsoft-com:vml" xmlns:pvml="urn:schemas-microsoft-com:office:powerpoint" xmlns:com="http://schemas.openxmlformats.org/drawingml/2006/compatibility" xmlns:p14="http://schemas.microsoft.com/office/powerpoint/2010/main" xmlns:p15="http://schemas.microsoft.com/office/powerpoint/2012/main" xmlns:go="http://customooxmlschemas.google.com/" r:id="rId60" roundtripDataSignature="AMtx7mjFyVUGRZWio+dc9dxzYsimUxNJbg=="/>
+      <go:slidesCustomData xmlns="" xmlns:mc="http://schemas.openxmlformats.org/markup-compatibility/2006" xmlns:mv="urn:schemas-microsoft-com:mac:vml" xmlns:c="http://schemas.openxmlformats.org/drawingml/2006/chart" xmlns:dgm="http://schemas.openxmlformats.org/drawingml/2006/diagram" xmlns:o="urn:schemas-microsoft-com:office:office" xmlns:v="urn:schemas-microsoft-com:vml" xmlns:pvml="urn:schemas-microsoft-com:office:powerpoint" xmlns:com="http://schemas.openxmlformats.org/drawingml/2006/compatibility" xmlns:p14="http://schemas.microsoft.com/office/powerpoint/2010/main" xmlns:p15="http://schemas.microsoft.com/office/powerpoint/2012/main" xmlns:go="http://customooxmlschemas.google.com/" r:id="rId62" roundtripDataSignature="AMtx7mjFyVUGRZWio+dc9dxzYsimUxNJbg=="/>
     </p:ext>
   </p:extLst>
 </p:presentation>
@@ -13292,7 +13294,7 @@
           <a:p>
             <a:fld id="{87916DAE-669F-3546-9A68-DB1260F5EB98}" type="slidenum">
               <a:rPr lang="en-US" smtClean="0"/>
-              <a:t>48</a:t>
+              <a:t>49</a:t>
             </a:fld>
             <a:endParaRPr lang="en-US"/>
           </a:p>
@@ -14675,7 +14677,7 @@
           <a:p>
             <a:fld id="{7C0312F8-2DE2-6B40-83C5-731724CAE2B0}" type="datetimeFigureOut">
               <a:rPr lang="en-US" smtClean="0"/>
-              <a:t>10/25/21</a:t>
+              <a:t>11/8/21</a:t>
             </a:fld>
             <a:endParaRPr lang="en-US"/>
           </a:p>
@@ -14960,7 +14962,7 @@
           <a:p>
             <a:fld id="{7C0312F8-2DE2-6B40-83C5-731724CAE2B0}" type="datetimeFigureOut">
               <a:rPr lang="en-US" smtClean="0"/>
-              <a:t>10/25/21</a:t>
+              <a:t>11/8/21</a:t>
             </a:fld>
             <a:endParaRPr lang="en-US"/>
           </a:p>
@@ -15379,7 +15381,7 @@
           <a:p>
             <a:fld id="{7C0312F8-2DE2-6B40-83C5-731724CAE2B0}" type="datetimeFigureOut">
               <a:rPr lang="en-US" smtClean="0"/>
-              <a:t>10/25/21</a:t>
+              <a:t>11/8/21</a:t>
             </a:fld>
             <a:endParaRPr lang="en-US"/>
           </a:p>
@@ -15474,7 +15476,7 @@
           <a:p>
             <a:fld id="{7C0312F8-2DE2-6B40-83C5-731724CAE2B0}" type="datetimeFigureOut">
               <a:rPr lang="en-US" smtClean="0"/>
-              <a:t>10/25/21</a:t>
+              <a:t>11/8/21</a:t>
             </a:fld>
             <a:endParaRPr lang="en-US"/>
           </a:p>
@@ -19308,7 +19310,7 @@
           <a:p>
             <a:fld id="{7C0312F8-2DE2-6B40-83C5-731724CAE2B0}" type="datetimeFigureOut">
               <a:rPr lang="en-US" smtClean="0"/>
-              <a:t>10/25/21</a:t>
+              <a:t>11/8/21</a:t>
             </a:fld>
             <a:endParaRPr lang="en-US"/>
           </a:p>
@@ -19926,6 +19928,129 @@
       </p:grpSpPr>
       <p:sp>
         <p:nvSpPr>
+          <p:cNvPr id="3" name="Title 2">
+            <a:extLst>
+              <a:ext uri="{FF2B5EF4-FFF2-40B4-BE49-F238E27FC236}">
+                <a16:creationId xmlns:a16="http://schemas.microsoft.com/office/drawing/2014/main" id="{9323871C-7CA8-1448-8FFC-1AE6E1838941}"/>
+              </a:ext>
+            </a:extLst>
+          </p:cNvPr>
+          <p:cNvSpPr>
+            <a:spLocks noGrp="1"/>
+          </p:cNvSpPr>
+          <p:nvPr>
+            <p:ph type="title"/>
+          </p:nvPr>
+        </p:nvSpPr>
+        <p:spPr/>
+        <p:txBody>
+          <a:bodyPr/>
+          <a:lstStyle/>
+          <a:p>
+            <a:r>
+              <a:rPr lang="en-US" dirty="0"/>
+              <a:t>Reminders</a:t>
+            </a:r>
+          </a:p>
+        </p:txBody>
+      </p:sp>
+      <p:sp>
+        <p:nvSpPr>
+          <p:cNvPr id="5" name="Text Placeholder 4">
+            <a:extLst>
+              <a:ext uri="{FF2B5EF4-FFF2-40B4-BE49-F238E27FC236}">
+                <a16:creationId xmlns:a16="http://schemas.microsoft.com/office/drawing/2014/main" id="{F4E0A5F0-1D89-954D-91FB-596CD9E690F2}"/>
+              </a:ext>
+            </a:extLst>
+          </p:cNvPr>
+          <p:cNvSpPr>
+            <a:spLocks noGrp="1"/>
+          </p:cNvSpPr>
+          <p:nvPr>
+            <p:ph type="body" idx="1"/>
+          </p:nvPr>
+        </p:nvSpPr>
+        <p:spPr/>
+        <p:txBody>
+          <a:bodyPr/>
+          <a:lstStyle/>
+          <a:p>
+            <a:pPr marL="76200" indent="0">
+              <a:buNone/>
+            </a:pPr>
+            <a:r>
+              <a:rPr lang="en-US" b="1" dirty="0"/>
+              <a:t>This week:</a:t>
+            </a:r>
+            <a:endParaRPr lang="en-US" dirty="0"/>
+          </a:p>
+          <a:p>
+            <a:r>
+              <a:rPr lang="en-US" dirty="0"/>
+              <a:t>Wednesday team check-ins</a:t>
+            </a:r>
+          </a:p>
+          <a:p>
+            <a:pPr marL="76200" indent="0">
+              <a:buNone/>
+            </a:pPr>
+            <a:endParaRPr lang="en-US" dirty="0"/>
+          </a:p>
+          <a:p>
+            <a:pPr marL="76200" indent="0">
+              <a:buNone/>
+            </a:pPr>
+            <a:r>
+              <a:rPr lang="en-US" b="1" dirty="0"/>
+              <a:t>Coming up next week:</a:t>
+            </a:r>
+          </a:p>
+          <a:p>
+            <a:r>
+              <a:rPr lang="en-US" dirty="0"/>
+              <a:t>Monday: Update 7 (on Canvas): ML Results Over Time and Model Selection</a:t>
+            </a:r>
+          </a:p>
+          <a:p>
+            <a:r>
+              <a:rPr lang="en-US" dirty="0"/>
+              <a:t>Tuesday: Feedback Form</a:t>
+            </a:r>
+          </a:p>
+        </p:txBody>
+      </p:sp>
+    </p:spTree>
+    <p:extLst>
+      <p:ext uri="{BB962C8B-B14F-4D97-AF65-F5344CB8AC3E}">
+        <p14:creationId xmlns:p14="http://schemas.microsoft.com/office/powerpoint/2010/main" val="545007648"/>
+      </p:ext>
+    </p:extLst>
+  </p:cSld>
+  <p:clrMapOvr>
+    <a:masterClrMapping/>
+  </p:clrMapOvr>
+</p:sld>
+</file>
+
+<file path=ppt/slides/slide11.xml><?xml version="1.0" encoding="utf-8"?>
+<p:sld xmlns:a="http://schemas.openxmlformats.org/drawingml/2006/main" xmlns:r="http://schemas.openxmlformats.org/officeDocument/2006/relationships" xmlns:p="http://schemas.openxmlformats.org/presentationml/2006/main">
+  <p:cSld>
+    <p:spTree>
+      <p:nvGrpSpPr>
+        <p:cNvPr id="1" name=""/>
+        <p:cNvGrpSpPr/>
+        <p:nvPr/>
+      </p:nvGrpSpPr>
+      <p:grpSpPr>
+        <a:xfrm>
+          <a:off x="0" y="0"/>
+          <a:ext cx="0" cy="0"/>
+          <a:chOff x="0" y="0"/>
+          <a:chExt cx="0" cy="0"/>
+        </a:xfrm>
+      </p:grpSpPr>
+      <p:sp>
+        <p:nvSpPr>
           <p:cNvPr id="4" name="Rectangle 3">
             <a:extLst>
               <a:ext uri="{FF2B5EF4-FFF2-40B4-BE49-F238E27FC236}">
@@ -20002,7 +20127,7 @@
 </p:sld>
 </file>
 
-<file path=ppt/slides/slide11.xml><?xml version="1.0" encoding="utf-8"?>
+<file path=ppt/slides/slide12.xml><?xml version="1.0" encoding="utf-8"?>
 <p:sld xmlns:a="http://schemas.openxmlformats.org/drawingml/2006/main" xmlns:r="http://schemas.openxmlformats.org/officeDocument/2006/relationships" xmlns:p="http://schemas.openxmlformats.org/presentationml/2006/main">
   <p:cSld>
     <p:spTree>
@@ -20131,7 +20256,7 @@
 </p:sld>
 </file>
 
-<file path=ppt/slides/slide12.xml><?xml version="1.0" encoding="utf-8"?>
+<file path=ppt/slides/slide13.xml><?xml version="1.0" encoding="utf-8"?>
 <p:sld xmlns:a="http://schemas.openxmlformats.org/drawingml/2006/main" xmlns:r="http://schemas.openxmlformats.org/officeDocument/2006/relationships" xmlns:p="http://schemas.openxmlformats.org/presentationml/2006/main">
   <p:cSld>
     <p:spTree>
@@ -20697,7 +20822,7 @@
 </p:sld>
 </file>
 
-<file path=ppt/slides/slide13.xml><?xml version="1.0" encoding="utf-8"?>
+<file path=ppt/slides/slide14.xml><?xml version="1.0" encoding="utf-8"?>
 <p:sld xmlns:a="http://schemas.openxmlformats.org/drawingml/2006/main" xmlns:r="http://schemas.openxmlformats.org/officeDocument/2006/relationships" xmlns:p="http://schemas.openxmlformats.org/presentationml/2006/main">
   <p:cSld>
     <p:spTree>
@@ -20796,106 +20921,6 @@
 </p:sld>
 </file>
 
-<file path=ppt/slides/slide14.xml><?xml version="1.0" encoding="utf-8"?>
-<p:sld xmlns:a="http://schemas.openxmlformats.org/drawingml/2006/main" xmlns:r="http://schemas.openxmlformats.org/officeDocument/2006/relationships" xmlns:p="http://schemas.openxmlformats.org/presentationml/2006/main">
-  <p:cSld>
-    <p:spTree>
-      <p:nvGrpSpPr>
-        <p:cNvPr id="1" name=""/>
-        <p:cNvGrpSpPr/>
-        <p:nvPr/>
-      </p:nvGrpSpPr>
-      <p:grpSpPr>
-        <a:xfrm>
-          <a:off x="0" y="0"/>
-          <a:ext cx="0" cy="0"/>
-          <a:chOff x="0" y="0"/>
-          <a:chExt cx="0" cy="0"/>
-        </a:xfrm>
-      </p:grpSpPr>
-      <p:sp>
-        <p:nvSpPr>
-          <p:cNvPr id="3" name="Title 2"/>
-          <p:cNvSpPr>
-            <a:spLocks noGrp="1"/>
-          </p:cNvSpPr>
-          <p:nvPr>
-            <p:ph type="title"/>
-          </p:nvPr>
-        </p:nvSpPr>
-        <p:spPr/>
-        <p:txBody>
-          <a:bodyPr/>
-          <a:lstStyle/>
-          <a:p>
-            <a:r>
-              <a:rPr lang="en-US" dirty="0"/>
-              <a:t>Why do we need to do model selection?</a:t>
-            </a:r>
-          </a:p>
-        </p:txBody>
-      </p:sp>
-      <p:sp>
-        <p:nvSpPr>
-          <p:cNvPr id="2" name="Content Placeholder 1"/>
-          <p:cNvSpPr>
-            <a:spLocks noGrp="1"/>
-          </p:cNvSpPr>
-          <p:nvPr>
-            <p:ph type="body" idx="1"/>
-          </p:nvPr>
-        </p:nvSpPr>
-        <p:spPr/>
-        <p:txBody>
-          <a:bodyPr/>
-          <a:lstStyle/>
-          <a:p>
-            <a:r>
-              <a:rPr lang="en-US" sz="2800" dirty="0"/>
-              <a:t>You’ve run a large number of different types of models varying …</a:t>
-            </a:r>
-          </a:p>
-          <a:p>
-            <a:endParaRPr lang="en-US" sz="2800" dirty="0"/>
-          </a:p>
-          <a:p>
-            <a:r>
-              <a:rPr lang="en-US" sz="2800" dirty="0"/>
-              <a:t>You need to understand what types of models are effective under what circumstances, </a:t>
-            </a:r>
-            <a:r>
-              <a:rPr lang="en-US" sz="2800" b="1" dirty="0"/>
-              <a:t>and</a:t>
-            </a:r>
-          </a:p>
-          <a:p>
-            <a:endParaRPr lang="en-US" sz="2800" b="1" dirty="0"/>
-          </a:p>
-          <a:p>
-            <a:r>
-              <a:rPr lang="en-US" sz="2800" dirty="0"/>
-              <a:t>You need to decide which one(s) to use in the </a:t>
-            </a:r>
-            <a:r>
-              <a:rPr lang="en-US" sz="2800" b="1" dirty="0"/>
-              <a:t>future</a:t>
-            </a:r>
-          </a:p>
-        </p:txBody>
-      </p:sp>
-    </p:spTree>
-    <p:extLst>
-      <p:ext uri="{BB962C8B-B14F-4D97-AF65-F5344CB8AC3E}">
-        <p14:creationId xmlns:p14="http://schemas.microsoft.com/office/powerpoint/2010/main" val="1343721693"/>
-      </p:ext>
-    </p:extLst>
-  </p:cSld>
-  <p:clrMapOvr>
-    <a:masterClrMapping/>
-  </p:clrMapOvr>
-</p:sld>
-</file>
-
 <file path=ppt/slides/slide15.xml><?xml version="1.0" encoding="utf-8"?>
 <p:sld xmlns:a="http://schemas.openxmlformats.org/drawingml/2006/main" xmlns:r="http://schemas.openxmlformats.org/officeDocument/2006/relationships" xmlns:p="http://schemas.openxmlformats.org/presentationml/2006/main">
   <p:cSld>
@@ -20930,6 +20955,106 @@
           <a:p>
             <a:r>
               <a:rPr lang="en-US" dirty="0"/>
+              <a:t>Why do we need to do model selection?</a:t>
+            </a:r>
+          </a:p>
+        </p:txBody>
+      </p:sp>
+      <p:sp>
+        <p:nvSpPr>
+          <p:cNvPr id="2" name="Content Placeholder 1"/>
+          <p:cNvSpPr>
+            <a:spLocks noGrp="1"/>
+          </p:cNvSpPr>
+          <p:nvPr>
+            <p:ph type="body" idx="1"/>
+          </p:nvPr>
+        </p:nvSpPr>
+        <p:spPr/>
+        <p:txBody>
+          <a:bodyPr/>
+          <a:lstStyle/>
+          <a:p>
+            <a:r>
+              <a:rPr lang="en-US" sz="2800" dirty="0"/>
+              <a:t>You’ve run a large number of different types of models varying …</a:t>
+            </a:r>
+          </a:p>
+          <a:p>
+            <a:endParaRPr lang="en-US" sz="2800" dirty="0"/>
+          </a:p>
+          <a:p>
+            <a:r>
+              <a:rPr lang="en-US" sz="2800" dirty="0"/>
+              <a:t>You need to understand what types of models are effective under what circumstances, </a:t>
+            </a:r>
+            <a:r>
+              <a:rPr lang="en-US" sz="2800" b="1" dirty="0"/>
+              <a:t>and</a:t>
+            </a:r>
+          </a:p>
+          <a:p>
+            <a:endParaRPr lang="en-US" sz="2800" b="1" dirty="0"/>
+          </a:p>
+          <a:p>
+            <a:r>
+              <a:rPr lang="en-US" sz="2800" dirty="0"/>
+              <a:t>You need to decide which one(s) to use in the </a:t>
+            </a:r>
+            <a:r>
+              <a:rPr lang="en-US" sz="2800" b="1" dirty="0"/>
+              <a:t>future</a:t>
+            </a:r>
+          </a:p>
+        </p:txBody>
+      </p:sp>
+    </p:spTree>
+    <p:extLst>
+      <p:ext uri="{BB962C8B-B14F-4D97-AF65-F5344CB8AC3E}">
+        <p14:creationId xmlns:p14="http://schemas.microsoft.com/office/powerpoint/2010/main" val="1343721693"/>
+      </p:ext>
+    </p:extLst>
+  </p:cSld>
+  <p:clrMapOvr>
+    <a:masterClrMapping/>
+  </p:clrMapOvr>
+</p:sld>
+</file>
+
+<file path=ppt/slides/slide16.xml><?xml version="1.0" encoding="utf-8"?>
+<p:sld xmlns:a="http://schemas.openxmlformats.org/drawingml/2006/main" xmlns:r="http://schemas.openxmlformats.org/officeDocument/2006/relationships" xmlns:p="http://schemas.openxmlformats.org/presentationml/2006/main">
+  <p:cSld>
+    <p:spTree>
+      <p:nvGrpSpPr>
+        <p:cNvPr id="1" name=""/>
+        <p:cNvGrpSpPr/>
+        <p:nvPr/>
+      </p:nvGrpSpPr>
+      <p:grpSpPr>
+        <a:xfrm>
+          <a:off x="0" y="0"/>
+          <a:ext cx="0" cy="0"/>
+          <a:chOff x="0" y="0"/>
+          <a:chExt cx="0" cy="0"/>
+        </a:xfrm>
+      </p:grpSpPr>
+      <p:sp>
+        <p:nvSpPr>
+          <p:cNvPr id="3" name="Title 2"/>
+          <p:cNvSpPr>
+            <a:spLocks noGrp="1"/>
+          </p:cNvSpPr>
+          <p:nvPr>
+            <p:ph type="title"/>
+          </p:nvPr>
+        </p:nvSpPr>
+        <p:spPr/>
+        <p:txBody>
+          <a:bodyPr/>
+          <a:lstStyle/>
+          <a:p>
+            <a:r>
+              <a:rPr lang="en-US" dirty="0"/>
               <a:t>The wonderful for loop</a:t>
             </a:r>
           </a:p>
@@ -21022,7 +21147,7 @@
 </p:sld>
 </file>
 
-<file path=ppt/slides/slide16.xml><?xml version="1.0" encoding="utf-8"?>
+<file path=ppt/slides/slide17.xml><?xml version="1.0" encoding="utf-8"?>
 <p:sld xmlns:a="http://schemas.openxmlformats.org/drawingml/2006/main" xmlns:r="http://schemas.openxmlformats.org/officeDocument/2006/relationships" xmlns:p="http://schemas.openxmlformats.org/presentationml/2006/main">
   <p:cSld>
     <p:spTree>
@@ -22151,7 +22276,7 @@
 </p:sld>
 </file>
 
-<file path=ppt/slides/slide17.xml><?xml version="1.0" encoding="utf-8"?>
+<file path=ppt/slides/slide18.xml><?xml version="1.0" encoding="utf-8"?>
 <p:sld xmlns:a="http://schemas.openxmlformats.org/drawingml/2006/main" xmlns:r="http://schemas.openxmlformats.org/officeDocument/2006/relationships" xmlns:p="http://schemas.openxmlformats.org/presentationml/2006/main">
   <p:cSld>
     <p:spTree>
@@ -22282,7 +22407,7 @@
 </p:sld>
 </file>
 
-<file path=ppt/slides/slide18.xml><?xml version="1.0" encoding="utf-8"?>
+<file path=ppt/slides/slide19.xml><?xml version="1.0" encoding="utf-8"?>
 <p:sld xmlns:a="http://schemas.openxmlformats.org/drawingml/2006/main" xmlns:r="http://schemas.openxmlformats.org/officeDocument/2006/relationships" xmlns:p="http://schemas.openxmlformats.org/presentationml/2006/main">
   <p:cSld>
     <p:spTree>
@@ -22374,7 +22499,140 @@
 </p:sld>
 </file>
 
-<file path=ppt/slides/slide19.xml><?xml version="1.0" encoding="utf-8"?>
+<file path=ppt/slides/slide2.xml><?xml version="1.0" encoding="utf-8"?>
+<p:sld xmlns:a="http://schemas.openxmlformats.org/drawingml/2006/main" xmlns:r="http://schemas.openxmlformats.org/officeDocument/2006/relationships" xmlns:p="http://schemas.openxmlformats.org/presentationml/2006/main" show="0">
+  <p:cSld>
+    <p:spTree>
+      <p:nvGrpSpPr>
+        <p:cNvPr id="1" name=""/>
+        <p:cNvGrpSpPr/>
+        <p:nvPr/>
+      </p:nvGrpSpPr>
+      <p:grpSpPr>
+        <a:xfrm>
+          <a:off x="0" y="0"/>
+          <a:ext cx="0" cy="0"/>
+          <a:chOff x="0" y="0"/>
+          <a:chExt cx="0" cy="0"/>
+        </a:xfrm>
+      </p:grpSpPr>
+      <p:sp>
+        <p:nvSpPr>
+          <p:cNvPr id="3" name="Title 2">
+            <a:extLst>
+              <a:ext uri="{FF2B5EF4-FFF2-40B4-BE49-F238E27FC236}">
+                <a16:creationId xmlns:a16="http://schemas.microsoft.com/office/drawing/2014/main" id="{9323871C-7CA8-1448-8FFC-1AE6E1838941}"/>
+              </a:ext>
+            </a:extLst>
+          </p:cNvPr>
+          <p:cNvSpPr>
+            <a:spLocks noGrp="1"/>
+          </p:cNvSpPr>
+          <p:nvPr>
+            <p:ph type="title"/>
+          </p:nvPr>
+        </p:nvSpPr>
+        <p:spPr/>
+        <p:txBody>
+          <a:bodyPr/>
+          <a:lstStyle/>
+          <a:p>
+            <a:r>
+              <a:rPr lang="en-US" dirty="0"/>
+              <a:t>Reminders</a:t>
+            </a:r>
+          </a:p>
+        </p:txBody>
+      </p:sp>
+      <p:sp>
+        <p:nvSpPr>
+          <p:cNvPr id="5" name="Text Placeholder 4">
+            <a:extLst>
+              <a:ext uri="{FF2B5EF4-FFF2-40B4-BE49-F238E27FC236}">
+                <a16:creationId xmlns:a16="http://schemas.microsoft.com/office/drawing/2014/main" id="{F4E0A5F0-1D89-954D-91FB-596CD9E690F2}"/>
+              </a:ext>
+            </a:extLst>
+          </p:cNvPr>
+          <p:cNvSpPr>
+            <a:spLocks noGrp="1"/>
+          </p:cNvSpPr>
+          <p:nvPr>
+            <p:ph type="body" idx="1"/>
+          </p:nvPr>
+        </p:nvSpPr>
+        <p:spPr/>
+        <p:txBody>
+          <a:bodyPr/>
+          <a:lstStyle/>
+          <a:p>
+            <a:pPr marL="76200" indent="0">
+              <a:buNone/>
+            </a:pPr>
+            <a:r>
+              <a:rPr lang="en-US" b="1" dirty="0"/>
+              <a:t>This week:</a:t>
+            </a:r>
+            <a:endParaRPr lang="en-US" dirty="0"/>
+          </a:p>
+          <a:p>
+            <a:r>
+              <a:rPr lang="en-US" dirty="0"/>
+              <a:t>Wednesday team check-ins</a:t>
+            </a:r>
+          </a:p>
+          <a:p>
+            <a:pPr marL="76200" indent="0">
+              <a:buNone/>
+            </a:pPr>
+            <a:endParaRPr lang="en-US" dirty="0"/>
+          </a:p>
+          <a:p>
+            <a:pPr marL="76200" indent="0">
+              <a:buNone/>
+            </a:pPr>
+            <a:r>
+              <a:rPr lang="en-US" b="1" dirty="0"/>
+              <a:t>Coming up next week:</a:t>
+            </a:r>
+          </a:p>
+          <a:p>
+            <a:r>
+              <a:rPr lang="en-US" dirty="0"/>
+              <a:t>Monday: Update 4 (on Canvas): v0 ML Results and Planned Model Grid</a:t>
+            </a:r>
+          </a:p>
+          <a:p>
+            <a:r>
+              <a:rPr lang="en-US" dirty="0"/>
+              <a:t>Tuesday: Feedback Form</a:t>
+            </a:r>
+          </a:p>
+          <a:p>
+            <a:r>
+              <a:rPr lang="en-US" dirty="0">
+                <a:solidFill>
+                  <a:srgbClr val="C00000"/>
+                </a:solidFill>
+              </a:rPr>
+              <a:t>Midterm Update Presentations (Tuesday and Thursday in class)</a:t>
+            </a:r>
+          </a:p>
+        </p:txBody>
+      </p:sp>
+    </p:spTree>
+    <p:extLst>
+      <p:ext uri="{BB962C8B-B14F-4D97-AF65-F5344CB8AC3E}">
+        <p14:creationId xmlns:p14="http://schemas.microsoft.com/office/powerpoint/2010/main" val="2066178716"/>
+      </p:ext>
+    </p:extLst>
+  </p:cSld>
+  <p:clrMapOvr>
+    <a:masterClrMapping/>
+  </p:clrMapOvr>
+</p:sld>
+</file>
+
+<file path=ppt/slides/slide20.xml><?xml version="1.0" encoding="utf-8"?>
 <p:sld xmlns:a="http://schemas.openxmlformats.org/drawingml/2006/main" xmlns:r="http://schemas.openxmlformats.org/officeDocument/2006/relationships" xmlns:p="http://schemas.openxmlformats.org/presentationml/2006/main">
   <p:cSld>
     <p:spTree>
@@ -22466,140 +22724,7 @@
 </p:sld>
 </file>
 
-<file path=ppt/slides/slide2.xml><?xml version="1.0" encoding="utf-8"?>
-<p:sld xmlns:a="http://schemas.openxmlformats.org/drawingml/2006/main" xmlns:r="http://schemas.openxmlformats.org/officeDocument/2006/relationships" xmlns:p="http://schemas.openxmlformats.org/presentationml/2006/main">
-  <p:cSld>
-    <p:spTree>
-      <p:nvGrpSpPr>
-        <p:cNvPr id="1" name=""/>
-        <p:cNvGrpSpPr/>
-        <p:nvPr/>
-      </p:nvGrpSpPr>
-      <p:grpSpPr>
-        <a:xfrm>
-          <a:off x="0" y="0"/>
-          <a:ext cx="0" cy="0"/>
-          <a:chOff x="0" y="0"/>
-          <a:chExt cx="0" cy="0"/>
-        </a:xfrm>
-      </p:grpSpPr>
-      <p:sp>
-        <p:nvSpPr>
-          <p:cNvPr id="3" name="Title 2">
-            <a:extLst>
-              <a:ext uri="{FF2B5EF4-FFF2-40B4-BE49-F238E27FC236}">
-                <a16:creationId xmlns:a16="http://schemas.microsoft.com/office/drawing/2014/main" id="{9323871C-7CA8-1448-8FFC-1AE6E1838941}"/>
-              </a:ext>
-            </a:extLst>
-          </p:cNvPr>
-          <p:cNvSpPr>
-            <a:spLocks noGrp="1"/>
-          </p:cNvSpPr>
-          <p:nvPr>
-            <p:ph type="title"/>
-          </p:nvPr>
-        </p:nvSpPr>
-        <p:spPr/>
-        <p:txBody>
-          <a:bodyPr/>
-          <a:lstStyle/>
-          <a:p>
-            <a:r>
-              <a:rPr lang="en-US" dirty="0"/>
-              <a:t>Reminders</a:t>
-            </a:r>
-          </a:p>
-        </p:txBody>
-      </p:sp>
-      <p:sp>
-        <p:nvSpPr>
-          <p:cNvPr id="5" name="Text Placeholder 4">
-            <a:extLst>
-              <a:ext uri="{FF2B5EF4-FFF2-40B4-BE49-F238E27FC236}">
-                <a16:creationId xmlns:a16="http://schemas.microsoft.com/office/drawing/2014/main" id="{F4E0A5F0-1D89-954D-91FB-596CD9E690F2}"/>
-              </a:ext>
-            </a:extLst>
-          </p:cNvPr>
-          <p:cNvSpPr>
-            <a:spLocks noGrp="1"/>
-          </p:cNvSpPr>
-          <p:nvPr>
-            <p:ph type="body" idx="1"/>
-          </p:nvPr>
-        </p:nvSpPr>
-        <p:spPr/>
-        <p:txBody>
-          <a:bodyPr/>
-          <a:lstStyle/>
-          <a:p>
-            <a:pPr marL="76200" indent="0">
-              <a:buNone/>
-            </a:pPr>
-            <a:r>
-              <a:rPr lang="en-US" b="1" dirty="0"/>
-              <a:t>This week:</a:t>
-            </a:r>
-            <a:endParaRPr lang="en-US" dirty="0"/>
-          </a:p>
-          <a:p>
-            <a:r>
-              <a:rPr lang="en-US" dirty="0"/>
-              <a:t>Wednesday team check-ins</a:t>
-            </a:r>
-          </a:p>
-          <a:p>
-            <a:pPr marL="76200" indent="0">
-              <a:buNone/>
-            </a:pPr>
-            <a:endParaRPr lang="en-US" dirty="0"/>
-          </a:p>
-          <a:p>
-            <a:pPr marL="76200" indent="0">
-              <a:buNone/>
-            </a:pPr>
-            <a:r>
-              <a:rPr lang="en-US" b="1" dirty="0"/>
-              <a:t>Coming up next week:</a:t>
-            </a:r>
-          </a:p>
-          <a:p>
-            <a:r>
-              <a:rPr lang="en-US" dirty="0"/>
-              <a:t>Monday: Update 4 (on Canvas): v0 ML Results and Planned Model Grid</a:t>
-            </a:r>
-          </a:p>
-          <a:p>
-            <a:r>
-              <a:rPr lang="en-US" dirty="0"/>
-              <a:t>Tuesday: Feedback Form</a:t>
-            </a:r>
-          </a:p>
-          <a:p>
-            <a:r>
-              <a:rPr lang="en-US" dirty="0">
-                <a:solidFill>
-                  <a:srgbClr val="C00000"/>
-                </a:solidFill>
-              </a:rPr>
-              <a:t>Midterm Update Presentations (Tuesday and Thursday in class)</a:t>
-            </a:r>
-          </a:p>
-        </p:txBody>
-      </p:sp>
-    </p:spTree>
-    <p:extLst>
-      <p:ext uri="{BB962C8B-B14F-4D97-AF65-F5344CB8AC3E}">
-        <p14:creationId xmlns:p14="http://schemas.microsoft.com/office/powerpoint/2010/main" val="2066178716"/>
-      </p:ext>
-    </p:extLst>
-  </p:cSld>
-  <p:clrMapOvr>
-    <a:masterClrMapping/>
-  </p:clrMapOvr>
-</p:sld>
-</file>
-
-<file path=ppt/slides/slide20.xml><?xml version="1.0" encoding="utf-8"?>
+<file path=ppt/slides/slide21.xml><?xml version="1.0" encoding="utf-8"?>
 <p:sld xmlns:a="http://schemas.openxmlformats.org/drawingml/2006/main" xmlns:r="http://schemas.openxmlformats.org/officeDocument/2006/relationships" xmlns:p="http://schemas.openxmlformats.org/presentationml/2006/main">
   <p:cSld>
     <p:spTree>
@@ -22691,7 +22816,7 @@
 </p:sld>
 </file>
 
-<file path=ppt/slides/slide21.xml><?xml version="1.0" encoding="utf-8"?>
+<file path=ppt/slides/slide22.xml><?xml version="1.0" encoding="utf-8"?>
 <p:sld xmlns:a="http://schemas.openxmlformats.org/drawingml/2006/main" xmlns:r="http://schemas.openxmlformats.org/officeDocument/2006/relationships" xmlns:p="http://schemas.openxmlformats.org/presentationml/2006/main">
   <p:cSld>
     <p:spTree>
@@ -22774,185 +22899,6 @@
     <p:extLst>
       <p:ext uri="{BB962C8B-B14F-4D97-AF65-F5344CB8AC3E}">
         <p14:creationId xmlns:p14="http://schemas.microsoft.com/office/powerpoint/2010/main" val="2714202845"/>
-      </p:ext>
-    </p:extLst>
-  </p:cSld>
-  <p:clrMapOvr>
-    <a:masterClrMapping/>
-  </p:clrMapOvr>
-</p:sld>
-</file>
-
-<file path=ppt/slides/slide22.xml><?xml version="1.0" encoding="utf-8"?>
-<p:sld xmlns:a="http://schemas.openxmlformats.org/drawingml/2006/main" xmlns:r="http://schemas.openxmlformats.org/officeDocument/2006/relationships" xmlns:p="http://schemas.openxmlformats.org/presentationml/2006/main">
-  <p:cSld>
-    <p:spTree>
-      <p:nvGrpSpPr>
-        <p:cNvPr id="1" name="Shape 454"/>
-        <p:cNvGrpSpPr/>
-        <p:nvPr/>
-      </p:nvGrpSpPr>
-      <p:grpSpPr>
-        <a:xfrm>
-          <a:off x="0" y="0"/>
-          <a:ext cx="0" cy="0"/>
-          <a:chOff x="0" y="0"/>
-          <a:chExt cx="0" cy="0"/>
-        </a:xfrm>
-      </p:grpSpPr>
-      <p:sp>
-        <p:nvSpPr>
-          <p:cNvPr id="455" name="Google Shape;455;p43"/>
-          <p:cNvSpPr txBox="1">
-            <a:spLocks noGrp="1"/>
-          </p:cNvSpPr>
-          <p:nvPr>
-            <p:ph type="title"/>
-          </p:nvPr>
-        </p:nvSpPr>
-        <p:spPr>
-          <a:prstGeom prst="rect">
-            <a:avLst/>
-          </a:prstGeom>
-        </p:spPr>
-        <p:txBody>
-          <a:bodyPr spcFirstLastPara="1" wrap="square" lIns="121900" tIns="60933" rIns="121900" bIns="60933" anchor="ctr" anchorCtr="0">
-            <a:noAutofit/>
-          </a:bodyPr>
-          <a:lstStyle/>
-          <a:p>
-            <a:r>
-              <a:rPr lang="en" dirty="0"/>
-              <a:t>Model Selection</a:t>
-            </a:r>
-            <a:endParaRPr sz="4000" b="1" dirty="0">
-              <a:latin typeface="Roboto"/>
-              <a:ea typeface="Roboto"/>
-              <a:cs typeface="Roboto"/>
-              <a:sym typeface="Roboto"/>
-            </a:endParaRPr>
-          </a:p>
-        </p:txBody>
-      </p:sp>
-      <p:sp>
-        <p:nvSpPr>
-          <p:cNvPr id="456" name="Google Shape;456;p43"/>
-          <p:cNvSpPr txBox="1">
-            <a:spLocks noGrp="1"/>
-          </p:cNvSpPr>
-          <p:nvPr>
-            <p:ph type="body" idx="1"/>
-          </p:nvPr>
-        </p:nvSpPr>
-        <p:spPr>
-          <a:xfrm>
-            <a:off x="415600" y="1536632"/>
-            <a:ext cx="11360700" cy="4787967"/>
-          </a:xfrm>
-          <a:prstGeom prst="rect">
-            <a:avLst/>
-          </a:prstGeom>
-        </p:spPr>
-        <p:txBody>
-          <a:bodyPr spcFirstLastPara="1" wrap="square" lIns="121900" tIns="60933" rIns="121900" bIns="60933" anchor="t" anchorCtr="0">
-            <a:noAutofit/>
-          </a:bodyPr>
-          <a:lstStyle/>
-          <a:p>
-            <a:pPr indent="-474121">
-              <a:buSzPts val="2000"/>
-            </a:pPr>
-            <a:r>
-              <a:rPr lang="en" sz="2667" dirty="0"/>
-              <a:t>How can you narrow hundreds or thousands of model specifications down to a handful of the best-performing ones?</a:t>
-            </a:r>
-            <a:br>
-              <a:rPr lang="en" sz="2667" dirty="0"/>
-            </a:br>
-            <a:endParaRPr sz="2667" dirty="0"/>
-          </a:p>
-          <a:p>
-            <a:pPr indent="-474121">
-              <a:spcBef>
-                <a:spcPts val="0"/>
-              </a:spcBef>
-              <a:buSzPts val="2000"/>
-            </a:pPr>
-            <a:r>
-              <a:rPr lang="en" sz="2667" dirty="0"/>
-              <a:t>How do you balance performance and stability?</a:t>
-            </a:r>
-            <a:endParaRPr sz="2667" dirty="0"/>
-          </a:p>
-          <a:p>
-            <a:pPr lvl="1" indent="-474121">
-              <a:spcBef>
-                <a:spcPts val="0"/>
-              </a:spcBef>
-              <a:buSzPts val="2000"/>
-            </a:pPr>
-            <a:r>
-              <a:rPr lang="en" sz="2667" dirty="0"/>
-              <a:t>mean performance?</a:t>
-            </a:r>
-            <a:endParaRPr sz="2667" dirty="0"/>
-          </a:p>
-          <a:p>
-            <a:pPr lvl="1" indent="-474121">
-              <a:spcBef>
-                <a:spcPts val="0"/>
-              </a:spcBef>
-              <a:buSzPts val="2000"/>
-            </a:pPr>
-            <a:r>
-              <a:rPr lang="en" sz="2667" dirty="0"/>
-              <a:t>balancing mean and variance?</a:t>
-            </a:r>
-            <a:endParaRPr sz="2667" dirty="0"/>
-          </a:p>
-          <a:p>
-            <a:pPr lvl="1" indent="-474121">
-              <a:spcBef>
-                <a:spcPts val="0"/>
-              </a:spcBef>
-              <a:buSzPts val="2000"/>
-            </a:pPr>
-            <a:r>
-              <a:rPr lang="en" sz="2667" dirty="0"/>
-              <a:t>recency-weighted mean?</a:t>
-            </a:r>
-            <a:br>
-              <a:rPr lang="en" sz="2667" dirty="0"/>
-            </a:br>
-            <a:endParaRPr sz="2667" dirty="0"/>
-          </a:p>
-          <a:p>
-            <a:pPr indent="-474121">
-              <a:spcBef>
-                <a:spcPts val="0"/>
-              </a:spcBef>
-              <a:buSzPts val="2000"/>
-            </a:pPr>
-            <a:r>
-              <a:rPr lang="en" sz="2667" dirty="0"/>
-              <a:t>W</a:t>
-            </a:r>
-            <a:r>
-              <a:rPr lang="en-US" sz="2667" dirty="0"/>
-              <a:t>h</a:t>
-            </a:r>
-            <a:r>
-              <a:rPr lang="en" sz="2667" dirty="0"/>
-              <a:t>at is the “regret” in subsequent time periods from using different strategies for choosing a model to deploy?</a:t>
-            </a:r>
-            <a:endParaRPr sz="2667" dirty="0"/>
-          </a:p>
-        </p:txBody>
-      </p:sp>
-    </p:spTree>
-    <p:extLst>
-      <p:ext uri="{BB962C8B-B14F-4D97-AF65-F5344CB8AC3E}">
-        <p14:creationId xmlns:p14="http://schemas.microsoft.com/office/powerpoint/2010/main" val="1094637480"/>
       </p:ext>
     </p:extLst>
   </p:cSld>
@@ -23038,6 +22984,185 @@
           </a:bodyPr>
           <a:lstStyle/>
           <a:p>
+            <a:pPr indent="-474121">
+              <a:buSzPts val="2000"/>
+            </a:pPr>
+            <a:r>
+              <a:rPr lang="en" sz="2667" dirty="0"/>
+              <a:t>How can you narrow hundreds or thousands of model specifications down to a handful of the best-performing ones?</a:t>
+            </a:r>
+            <a:br>
+              <a:rPr lang="en" sz="2667" dirty="0"/>
+            </a:br>
+            <a:endParaRPr sz="2667" dirty="0"/>
+          </a:p>
+          <a:p>
+            <a:pPr indent="-474121">
+              <a:spcBef>
+                <a:spcPts val="0"/>
+              </a:spcBef>
+              <a:buSzPts val="2000"/>
+            </a:pPr>
+            <a:r>
+              <a:rPr lang="en" sz="2667" dirty="0"/>
+              <a:t>How do you balance performance and stability?</a:t>
+            </a:r>
+            <a:endParaRPr sz="2667" dirty="0"/>
+          </a:p>
+          <a:p>
+            <a:pPr lvl="1" indent="-474121">
+              <a:spcBef>
+                <a:spcPts val="0"/>
+              </a:spcBef>
+              <a:buSzPts val="2000"/>
+            </a:pPr>
+            <a:r>
+              <a:rPr lang="en" sz="2667" dirty="0"/>
+              <a:t>mean performance?</a:t>
+            </a:r>
+            <a:endParaRPr sz="2667" dirty="0"/>
+          </a:p>
+          <a:p>
+            <a:pPr lvl="1" indent="-474121">
+              <a:spcBef>
+                <a:spcPts val="0"/>
+              </a:spcBef>
+              <a:buSzPts val="2000"/>
+            </a:pPr>
+            <a:r>
+              <a:rPr lang="en" sz="2667" dirty="0"/>
+              <a:t>balancing mean and variance?</a:t>
+            </a:r>
+            <a:endParaRPr sz="2667" dirty="0"/>
+          </a:p>
+          <a:p>
+            <a:pPr lvl="1" indent="-474121">
+              <a:spcBef>
+                <a:spcPts val="0"/>
+              </a:spcBef>
+              <a:buSzPts val="2000"/>
+            </a:pPr>
+            <a:r>
+              <a:rPr lang="en" sz="2667" dirty="0"/>
+              <a:t>recency-weighted mean?</a:t>
+            </a:r>
+            <a:br>
+              <a:rPr lang="en" sz="2667" dirty="0"/>
+            </a:br>
+            <a:endParaRPr sz="2667" dirty="0"/>
+          </a:p>
+          <a:p>
+            <a:pPr indent="-474121">
+              <a:spcBef>
+                <a:spcPts val="0"/>
+              </a:spcBef>
+              <a:buSzPts val="2000"/>
+            </a:pPr>
+            <a:r>
+              <a:rPr lang="en" sz="2667" dirty="0"/>
+              <a:t>W</a:t>
+            </a:r>
+            <a:r>
+              <a:rPr lang="en-US" sz="2667" dirty="0"/>
+              <a:t>h</a:t>
+            </a:r>
+            <a:r>
+              <a:rPr lang="en" sz="2667" dirty="0"/>
+              <a:t>at is the “regret” in subsequent time periods from using different strategies for choosing a model to deploy?</a:t>
+            </a:r>
+            <a:endParaRPr sz="2667" dirty="0"/>
+          </a:p>
+        </p:txBody>
+      </p:sp>
+    </p:spTree>
+    <p:extLst>
+      <p:ext uri="{BB962C8B-B14F-4D97-AF65-F5344CB8AC3E}">
+        <p14:creationId xmlns:p14="http://schemas.microsoft.com/office/powerpoint/2010/main" val="1094637480"/>
+      </p:ext>
+    </p:extLst>
+  </p:cSld>
+  <p:clrMapOvr>
+    <a:masterClrMapping/>
+  </p:clrMapOvr>
+</p:sld>
+</file>
+
+<file path=ppt/slides/slide24.xml><?xml version="1.0" encoding="utf-8"?>
+<p:sld xmlns:a="http://schemas.openxmlformats.org/drawingml/2006/main" xmlns:r="http://schemas.openxmlformats.org/officeDocument/2006/relationships" xmlns:p="http://schemas.openxmlformats.org/presentationml/2006/main">
+  <p:cSld>
+    <p:spTree>
+      <p:nvGrpSpPr>
+        <p:cNvPr id="1" name="Shape 454"/>
+        <p:cNvGrpSpPr/>
+        <p:nvPr/>
+      </p:nvGrpSpPr>
+      <p:grpSpPr>
+        <a:xfrm>
+          <a:off x="0" y="0"/>
+          <a:ext cx="0" cy="0"/>
+          <a:chOff x="0" y="0"/>
+          <a:chExt cx="0" cy="0"/>
+        </a:xfrm>
+      </p:grpSpPr>
+      <p:sp>
+        <p:nvSpPr>
+          <p:cNvPr id="455" name="Google Shape;455;p43"/>
+          <p:cNvSpPr txBox="1">
+            <a:spLocks noGrp="1"/>
+          </p:cNvSpPr>
+          <p:nvPr>
+            <p:ph type="title"/>
+          </p:nvPr>
+        </p:nvSpPr>
+        <p:spPr>
+          <a:prstGeom prst="rect">
+            <a:avLst/>
+          </a:prstGeom>
+        </p:spPr>
+        <p:txBody>
+          <a:bodyPr spcFirstLastPara="1" wrap="square" lIns="121900" tIns="60933" rIns="121900" bIns="60933" anchor="ctr" anchorCtr="0">
+            <a:noAutofit/>
+          </a:bodyPr>
+          <a:lstStyle/>
+          <a:p>
+            <a:r>
+              <a:rPr lang="en" dirty="0"/>
+              <a:t>Model Selection</a:t>
+            </a:r>
+            <a:endParaRPr sz="4000" b="1" dirty="0">
+              <a:latin typeface="Roboto"/>
+              <a:ea typeface="Roboto"/>
+              <a:cs typeface="Roboto"/>
+              <a:sym typeface="Roboto"/>
+            </a:endParaRPr>
+          </a:p>
+        </p:txBody>
+      </p:sp>
+      <p:sp>
+        <p:nvSpPr>
+          <p:cNvPr id="456" name="Google Shape;456;p43"/>
+          <p:cNvSpPr txBox="1">
+            <a:spLocks noGrp="1"/>
+          </p:cNvSpPr>
+          <p:nvPr>
+            <p:ph type="body" idx="1"/>
+          </p:nvPr>
+        </p:nvSpPr>
+        <p:spPr>
+          <a:xfrm>
+            <a:off x="415600" y="1536632"/>
+            <a:ext cx="11360700" cy="4787967"/>
+          </a:xfrm>
+          <a:prstGeom prst="rect">
+            <a:avLst/>
+          </a:prstGeom>
+        </p:spPr>
+        <p:txBody>
+          <a:bodyPr spcFirstLastPara="1" wrap="square" lIns="121900" tIns="60933" rIns="121900" bIns="60933" anchor="t" anchorCtr="0">
+            <a:noAutofit/>
+          </a:bodyPr>
+          <a:lstStyle/>
+          <a:p>
             <a:pPr marL="0" indent="0">
               <a:buSzPts val="2000"/>
               <a:buNone/>
@@ -23110,7 +23235,7 @@
 </p:sld>
 </file>
 
-<file path=ppt/slides/slide24.xml><?xml version="1.0" encoding="utf-8"?>
+<file path=ppt/slides/slide25.xml><?xml version="1.0" encoding="utf-8"?>
 <p:sld xmlns:a="http://schemas.openxmlformats.org/drawingml/2006/main" xmlns:r="http://schemas.openxmlformats.org/officeDocument/2006/relationships" xmlns:p="http://schemas.openxmlformats.org/presentationml/2006/main">
   <p:cSld>
     <p:spTree>
@@ -23312,7 +23437,7 @@
 </p:sld>
 </file>
 
-<file path=ppt/slides/slide25.xml><?xml version="1.0" encoding="utf-8"?>
+<file path=ppt/slides/slide26.xml><?xml version="1.0" encoding="utf-8"?>
 <p:sld xmlns:a="http://schemas.openxmlformats.org/drawingml/2006/main" xmlns:r="http://schemas.openxmlformats.org/officeDocument/2006/relationships" xmlns:p="http://schemas.openxmlformats.org/presentationml/2006/main">
   <p:cSld>
     <p:spTree>
@@ -23531,7 +23656,7 @@
 </p:sld>
 </file>
 
-<file path=ppt/slides/slide26.xml><?xml version="1.0" encoding="utf-8"?>
+<file path=ppt/slides/slide27.xml><?xml version="1.0" encoding="utf-8"?>
 <p:sld xmlns:a="http://schemas.openxmlformats.org/drawingml/2006/main" xmlns:r="http://schemas.openxmlformats.org/officeDocument/2006/relationships" xmlns:p="http://schemas.openxmlformats.org/presentationml/2006/main">
   <p:cSld>
     <p:spTree>
@@ -23991,7 +24116,7 @@
 </p:sld>
 </file>
 
-<file path=ppt/slides/slide27.xml><?xml version="1.0" encoding="utf-8"?>
+<file path=ppt/slides/slide28.xml><?xml version="1.0" encoding="utf-8"?>
 <p:sld xmlns:a="http://schemas.openxmlformats.org/drawingml/2006/main" xmlns:r="http://schemas.openxmlformats.org/officeDocument/2006/relationships" xmlns:p="http://schemas.openxmlformats.org/presentationml/2006/main">
   <p:cSld>
     <p:spTree>
@@ -24257,7 +24382,7 @@
 </p:sld>
 </file>
 
-<file path=ppt/slides/slide28.xml><?xml version="1.0" encoding="utf-8"?>
+<file path=ppt/slides/slide29.xml><?xml version="1.0" encoding="utf-8"?>
 <p:sld xmlns:a="http://schemas.openxmlformats.org/drawingml/2006/main" xmlns:r="http://schemas.openxmlformats.org/officeDocument/2006/relationships" xmlns:p="http://schemas.openxmlformats.org/presentationml/2006/main">
   <p:cSld>
     <p:spTree>
@@ -24568,7 +24693,146 @@
 </p:sld>
 </file>
 
-<file path=ppt/slides/slide29.xml><?xml version="1.0" encoding="utf-8"?>
+<file path=ppt/slides/slide3.xml><?xml version="1.0" encoding="utf-8"?>
+<p:sld xmlns:a="http://schemas.openxmlformats.org/drawingml/2006/main" xmlns:r="http://schemas.openxmlformats.org/officeDocument/2006/relationships" xmlns:p="http://schemas.openxmlformats.org/presentationml/2006/main" show="0">
+  <p:cSld>
+    <p:spTree>
+      <p:nvGrpSpPr>
+        <p:cNvPr id="1" name=""/>
+        <p:cNvGrpSpPr/>
+        <p:nvPr/>
+      </p:nvGrpSpPr>
+      <p:grpSpPr>
+        <a:xfrm>
+          <a:off x="0" y="0"/>
+          <a:ext cx="0" cy="0"/>
+          <a:chOff x="0" y="0"/>
+          <a:chExt cx="0" cy="0"/>
+        </a:xfrm>
+      </p:grpSpPr>
+      <p:sp>
+        <p:nvSpPr>
+          <p:cNvPr id="2" name="Title 1">
+            <a:extLst>
+              <a:ext uri="{FF2B5EF4-FFF2-40B4-BE49-F238E27FC236}">
+                <a16:creationId xmlns:a16="http://schemas.microsoft.com/office/drawing/2014/main" id="{A073B702-ED77-884E-88F7-92D73313F38D}"/>
+              </a:ext>
+            </a:extLst>
+          </p:cNvPr>
+          <p:cNvSpPr>
+            <a:spLocks noGrp="1"/>
+          </p:cNvSpPr>
+          <p:nvPr>
+            <p:ph type="title"/>
+          </p:nvPr>
+        </p:nvSpPr>
+        <p:spPr/>
+        <p:txBody>
+          <a:bodyPr/>
+          <a:lstStyle/>
+          <a:p>
+            <a:r>
+              <a:rPr lang="en-US" dirty="0"/>
+              <a:t>Plan for the week</a:t>
+            </a:r>
+          </a:p>
+        </p:txBody>
+      </p:sp>
+      <p:sp>
+        <p:nvSpPr>
+          <p:cNvPr id="3" name="Text Placeholder 2">
+            <a:extLst>
+              <a:ext uri="{FF2B5EF4-FFF2-40B4-BE49-F238E27FC236}">
+                <a16:creationId xmlns:a16="http://schemas.microsoft.com/office/drawing/2014/main" id="{7861BAD4-F7FB-1D48-9D37-2273592A75CE}"/>
+              </a:ext>
+            </a:extLst>
+          </p:cNvPr>
+          <p:cNvSpPr>
+            <a:spLocks noGrp="1"/>
+          </p:cNvSpPr>
+          <p:nvPr>
+            <p:ph type="body" idx="1"/>
+          </p:nvPr>
+        </p:nvSpPr>
+        <p:spPr/>
+        <p:txBody>
+          <a:bodyPr/>
+          <a:lstStyle/>
+          <a:p>
+            <a:r>
+              <a:rPr lang="en-US" dirty="0"/>
+              <a:t>What you should be discussing this week within your team</a:t>
+            </a:r>
+          </a:p>
+          <a:p>
+            <a:pPr lvl="1"/>
+            <a:r>
+              <a:rPr lang="en-US" dirty="0"/>
+              <a:t>Finalizing your configuration file for preliminary model runs</a:t>
+            </a:r>
+          </a:p>
+          <a:p>
+            <a:pPr lvl="1"/>
+            <a:r>
+              <a:rPr lang="en-US" dirty="0"/>
+              <a:t>Plans for what larger model grid your want to run</a:t>
+            </a:r>
+          </a:p>
+          <a:p>
+            <a:pPr lvl="1"/>
+            <a:r>
+              <a:rPr lang="en-US" dirty="0"/>
+              <a:t>Plans for iterating on features</a:t>
+            </a:r>
+          </a:p>
+          <a:p>
+            <a:pPr lvl="1"/>
+            <a:endParaRPr lang="en-US" dirty="0"/>
+          </a:p>
+          <a:p>
+            <a:r>
+              <a:rPr lang="en-US" dirty="0"/>
+              <a:t>What you should be building this week</a:t>
+            </a:r>
+          </a:p>
+          <a:p>
+            <a:pPr lvl="1"/>
+            <a:r>
+              <a:rPr lang="en-US" dirty="0"/>
+              <a:t>Encoding your baselines into triage</a:t>
+            </a:r>
+          </a:p>
+          <a:p>
+            <a:pPr lvl="1"/>
+            <a:r>
+              <a:rPr lang="en-US" dirty="0"/>
+              <a:t>Initial “v0” triage runs with </a:t>
+            </a:r>
+            <a:r>
+              <a:rPr lang="en-US" b="1" u="sng" dirty="0"/>
+              <a:t>very simple</a:t>
+            </a:r>
+            <a:r>
+              <a:rPr lang="en-US" dirty="0"/>
+              <a:t> models and features</a:t>
+            </a:r>
+          </a:p>
+        </p:txBody>
+      </p:sp>
+    </p:spTree>
+    <p:extLst>
+      <p:ext uri="{BB962C8B-B14F-4D97-AF65-F5344CB8AC3E}">
+        <p14:creationId xmlns:p14="http://schemas.microsoft.com/office/powerpoint/2010/main" val="3631443768"/>
+      </p:ext>
+    </p:extLst>
+  </p:cSld>
+  <p:clrMapOvr>
+    <a:masterClrMapping/>
+  </p:clrMapOvr>
+</p:sld>
+</file>
+
+<file path=ppt/slides/slide30.xml><?xml version="1.0" encoding="utf-8"?>
 <p:sld xmlns:a="http://schemas.openxmlformats.org/drawingml/2006/main" xmlns:r="http://schemas.openxmlformats.org/officeDocument/2006/relationships" xmlns:p="http://schemas.openxmlformats.org/presentationml/2006/main">
   <p:cSld>
     <p:spTree>
@@ -24896,139 +25160,7 @@
 </p:sld>
 </file>
 
-<file path=ppt/slides/slide3.xml><?xml version="1.0" encoding="utf-8"?>
-<p:sld xmlns:a="http://schemas.openxmlformats.org/drawingml/2006/main" xmlns:r="http://schemas.openxmlformats.org/officeDocument/2006/relationships" xmlns:p="http://schemas.openxmlformats.org/presentationml/2006/main">
-  <p:cSld>
-    <p:spTree>
-      <p:nvGrpSpPr>
-        <p:cNvPr id="1" name=""/>
-        <p:cNvGrpSpPr/>
-        <p:nvPr/>
-      </p:nvGrpSpPr>
-      <p:grpSpPr>
-        <a:xfrm>
-          <a:off x="0" y="0"/>
-          <a:ext cx="0" cy="0"/>
-          <a:chOff x="0" y="0"/>
-          <a:chExt cx="0" cy="0"/>
-        </a:xfrm>
-      </p:grpSpPr>
-      <p:sp>
-        <p:nvSpPr>
-          <p:cNvPr id="2" name="Title 1">
-            <a:extLst>
-              <a:ext uri="{FF2B5EF4-FFF2-40B4-BE49-F238E27FC236}">
-                <a16:creationId xmlns:a16="http://schemas.microsoft.com/office/drawing/2014/main" id="{A073B702-ED77-884E-88F7-92D73313F38D}"/>
-              </a:ext>
-            </a:extLst>
-          </p:cNvPr>
-          <p:cNvSpPr>
-            <a:spLocks noGrp="1"/>
-          </p:cNvSpPr>
-          <p:nvPr>
-            <p:ph type="title"/>
-          </p:nvPr>
-        </p:nvSpPr>
-        <p:spPr/>
-        <p:txBody>
-          <a:bodyPr/>
-          <a:lstStyle/>
-          <a:p>
-            <a:r>
-              <a:rPr lang="en-US" dirty="0"/>
-              <a:t>Plan for the week</a:t>
-            </a:r>
-          </a:p>
-        </p:txBody>
-      </p:sp>
-      <p:sp>
-        <p:nvSpPr>
-          <p:cNvPr id="3" name="Text Placeholder 2">
-            <a:extLst>
-              <a:ext uri="{FF2B5EF4-FFF2-40B4-BE49-F238E27FC236}">
-                <a16:creationId xmlns:a16="http://schemas.microsoft.com/office/drawing/2014/main" id="{7861BAD4-F7FB-1D48-9D37-2273592A75CE}"/>
-              </a:ext>
-            </a:extLst>
-          </p:cNvPr>
-          <p:cNvSpPr>
-            <a:spLocks noGrp="1"/>
-          </p:cNvSpPr>
-          <p:nvPr>
-            <p:ph type="body" idx="1"/>
-          </p:nvPr>
-        </p:nvSpPr>
-        <p:spPr/>
-        <p:txBody>
-          <a:bodyPr/>
-          <a:lstStyle/>
-          <a:p>
-            <a:r>
-              <a:rPr lang="en-US" dirty="0"/>
-              <a:t>What you should be discussing this week within your team</a:t>
-            </a:r>
-          </a:p>
-          <a:p>
-            <a:pPr lvl="1"/>
-            <a:r>
-              <a:rPr lang="en-US" dirty="0"/>
-              <a:t>Finalizing your configuration file for preliminary model runs</a:t>
-            </a:r>
-          </a:p>
-          <a:p>
-            <a:pPr lvl="1"/>
-            <a:r>
-              <a:rPr lang="en-US" dirty="0"/>
-              <a:t>Plans for what larger model grid your want to run</a:t>
-            </a:r>
-          </a:p>
-          <a:p>
-            <a:pPr lvl="1"/>
-            <a:r>
-              <a:rPr lang="en-US" dirty="0"/>
-              <a:t>Plans for iterating on features</a:t>
-            </a:r>
-          </a:p>
-          <a:p>
-            <a:pPr lvl="1"/>
-            <a:endParaRPr lang="en-US" dirty="0"/>
-          </a:p>
-          <a:p>
-            <a:r>
-              <a:rPr lang="en-US" dirty="0"/>
-              <a:t>What you should be building this week</a:t>
-            </a:r>
-          </a:p>
-          <a:p>
-            <a:pPr lvl="1"/>
-            <a:r>
-              <a:rPr lang="en-US" dirty="0"/>
-              <a:t>Initial “v0” triage runs with </a:t>
-            </a:r>
-            <a:r>
-              <a:rPr lang="en-US" b="1" u="sng" dirty="0"/>
-              <a:t>very simple</a:t>
-            </a:r>
-            <a:r>
-              <a:rPr lang="en-US" dirty="0"/>
-              <a:t> models and features</a:t>
-            </a:r>
-          </a:p>
-        </p:txBody>
-      </p:sp>
-    </p:spTree>
-    <p:extLst>
-      <p:ext uri="{BB962C8B-B14F-4D97-AF65-F5344CB8AC3E}">
-        <p14:creationId xmlns:p14="http://schemas.microsoft.com/office/powerpoint/2010/main" val="3631443768"/>
-      </p:ext>
-    </p:extLst>
-  </p:cSld>
-  <p:clrMapOvr>
-    <a:masterClrMapping/>
-  </p:clrMapOvr>
-</p:sld>
-</file>
-
-<file path=ppt/slides/slide30.xml><?xml version="1.0" encoding="utf-8"?>
+<file path=ppt/slides/slide31.xml><?xml version="1.0" encoding="utf-8"?>
 <p:sld xmlns:a="http://schemas.openxmlformats.org/drawingml/2006/main" xmlns:r="http://schemas.openxmlformats.org/officeDocument/2006/relationships" xmlns:p="http://schemas.openxmlformats.org/presentationml/2006/main">
   <p:cSld>
     <p:spTree>
@@ -25353,7 +25485,7 @@
 </p:sld>
 </file>
 
-<file path=ppt/slides/slide31.xml><?xml version="1.0" encoding="utf-8"?>
+<file path=ppt/slides/slide32.xml><?xml version="1.0" encoding="utf-8"?>
 <p:sld xmlns:a="http://schemas.openxmlformats.org/drawingml/2006/main" xmlns:r="http://schemas.openxmlformats.org/officeDocument/2006/relationships" xmlns:p="http://schemas.openxmlformats.org/presentationml/2006/main">
   <p:cSld>
     <p:spTree>
@@ -25839,7 +25971,7 @@
 </p:sld>
 </file>
 
-<file path=ppt/slides/slide32.xml><?xml version="1.0" encoding="utf-8"?>
+<file path=ppt/slides/slide33.xml><?xml version="1.0" encoding="utf-8"?>
 <p:sld xmlns:a="http://schemas.openxmlformats.org/drawingml/2006/main" xmlns:r="http://schemas.openxmlformats.org/officeDocument/2006/relationships" xmlns:p="http://schemas.openxmlformats.org/presentationml/2006/main">
   <p:cSld>
     <p:spTree>
@@ -26371,7 +26503,7 @@
 </p:sld>
 </file>
 
-<file path=ppt/slides/slide33.xml><?xml version="1.0" encoding="utf-8"?>
+<file path=ppt/slides/slide34.xml><?xml version="1.0" encoding="utf-8"?>
 <p:sld xmlns:a="http://schemas.openxmlformats.org/drawingml/2006/main" xmlns:r="http://schemas.openxmlformats.org/officeDocument/2006/relationships" xmlns:p="http://schemas.openxmlformats.org/presentationml/2006/main">
   <p:cSld>
     <p:spTree>
@@ -26465,7 +26597,7 @@
 </p:sld>
 </file>
 
-<file path=ppt/slides/slide34.xml><?xml version="1.0" encoding="utf-8"?>
+<file path=ppt/slides/slide35.xml><?xml version="1.0" encoding="utf-8"?>
 <p:sld xmlns:a="http://schemas.openxmlformats.org/drawingml/2006/main" xmlns:r="http://schemas.openxmlformats.org/officeDocument/2006/relationships" xmlns:p="http://schemas.openxmlformats.org/presentationml/2006/main">
   <p:cSld>
     <p:spTree>
@@ -26559,7 +26691,7 @@
 </p:sld>
 </file>
 
-<file path=ppt/slides/slide35.xml><?xml version="1.0" encoding="utf-8"?>
+<file path=ppt/slides/slide36.xml><?xml version="1.0" encoding="utf-8"?>
 <p:sld xmlns:a="http://schemas.openxmlformats.org/drawingml/2006/main" xmlns:r="http://schemas.openxmlformats.org/officeDocument/2006/relationships" xmlns:p="http://schemas.openxmlformats.org/presentationml/2006/main">
   <p:cSld>
     <p:spTree>
@@ -26721,7 +26853,7 @@
 </p:sld>
 </file>
 
-<file path=ppt/slides/slide36.xml><?xml version="1.0" encoding="utf-8"?>
+<file path=ppt/slides/slide37.xml><?xml version="1.0" encoding="utf-8"?>
 <p:sld xmlns:a="http://schemas.openxmlformats.org/drawingml/2006/main" xmlns:r="http://schemas.openxmlformats.org/officeDocument/2006/relationships" xmlns:p="http://schemas.openxmlformats.org/presentationml/2006/main">
   <p:cSld>
     <p:spTree>
@@ -26869,7 +27001,7 @@
 </p:sld>
 </file>
 
-<file path=ppt/slides/slide37.xml><?xml version="1.0" encoding="utf-8"?>
+<file path=ppt/slides/slide38.xml><?xml version="1.0" encoding="utf-8"?>
 <p:sld xmlns:a="http://schemas.openxmlformats.org/drawingml/2006/main" xmlns:r="http://schemas.openxmlformats.org/officeDocument/2006/relationships" xmlns:p="http://schemas.openxmlformats.org/presentationml/2006/main">
   <p:cSld>
     <p:spTree>
@@ -26981,94 +27113,6 @@
     <p:extLst>
       <p:ext uri="{BB962C8B-B14F-4D97-AF65-F5344CB8AC3E}">
         <p14:creationId xmlns:p14="http://schemas.microsoft.com/office/powerpoint/2010/main" val="136932352"/>
-      </p:ext>
-    </p:extLst>
-  </p:cSld>
-  <p:clrMapOvr>
-    <a:masterClrMapping/>
-  </p:clrMapOvr>
-</p:sld>
-</file>
-
-<file path=ppt/slides/slide38.xml><?xml version="1.0" encoding="utf-8"?>
-<p:sld xmlns:a="http://schemas.openxmlformats.org/drawingml/2006/main" xmlns:r="http://schemas.openxmlformats.org/officeDocument/2006/relationships" xmlns:p="http://schemas.openxmlformats.org/presentationml/2006/main" show="0">
-  <p:cSld>
-    <p:spTree>
-      <p:nvGrpSpPr>
-        <p:cNvPr id="1" name=""/>
-        <p:cNvGrpSpPr/>
-        <p:nvPr/>
-      </p:nvGrpSpPr>
-      <p:grpSpPr>
-        <a:xfrm>
-          <a:off x="0" y="0"/>
-          <a:ext cx="0" cy="0"/>
-          <a:chOff x="0" y="0"/>
-          <a:chExt cx="0" cy="0"/>
-        </a:xfrm>
-      </p:grpSpPr>
-      <p:sp>
-        <p:nvSpPr>
-          <p:cNvPr id="3" name="Title 2">
-            <a:extLst>
-              <a:ext uri="{FF2B5EF4-FFF2-40B4-BE49-F238E27FC236}">
-                <a16:creationId xmlns:a16="http://schemas.microsoft.com/office/drawing/2014/main" id="{9323871C-7CA8-1448-8FFC-1AE6E1838941}"/>
-              </a:ext>
-            </a:extLst>
-          </p:cNvPr>
-          <p:cNvSpPr>
-            <a:spLocks noGrp="1"/>
-          </p:cNvSpPr>
-          <p:nvPr>
-            <p:ph type="title"/>
-          </p:nvPr>
-        </p:nvSpPr>
-        <p:spPr/>
-        <p:txBody>
-          <a:bodyPr/>
-          <a:lstStyle/>
-          <a:p>
-            <a:r>
-              <a:rPr lang="en-US" dirty="0"/>
-              <a:t>Some Open Research Questions</a:t>
-            </a:r>
-          </a:p>
-        </p:txBody>
-      </p:sp>
-      <p:pic>
-        <p:nvPicPr>
-          <p:cNvPr id="6" name="Picture 5">
-            <a:extLst>
-              <a:ext uri="{FF2B5EF4-FFF2-40B4-BE49-F238E27FC236}">
-                <a16:creationId xmlns:a16="http://schemas.microsoft.com/office/drawing/2014/main" id="{4B9B5C17-6333-3542-BF92-961541BDC881}"/>
-              </a:ext>
-            </a:extLst>
-          </p:cNvPr>
-          <p:cNvPicPr>
-            <a:picLocks noChangeAspect="1"/>
-          </p:cNvPicPr>
-          <p:nvPr/>
-        </p:nvPicPr>
-        <p:blipFill>
-          <a:blip r:embed="rId2"/>
-          <a:stretch>
-            <a:fillRect/>
-          </a:stretch>
-        </p:blipFill>
-        <p:spPr>
-          <a:xfrm>
-            <a:off x="1169439" y="1257300"/>
-            <a:ext cx="9853121" cy="5023746"/>
-          </a:xfrm>
-          <a:prstGeom prst="rect">
-            <a:avLst/>
-          </a:prstGeom>
-        </p:spPr>
-      </p:pic>
-    </p:spTree>
-    <p:extLst>
-      <p:ext uri="{BB962C8B-B14F-4D97-AF65-F5344CB8AC3E}">
-        <p14:creationId xmlns:p14="http://schemas.microsoft.com/office/powerpoint/2010/main" val="1478637945"/>
       </p:ext>
     </p:extLst>
   </p:cSld>
@@ -27123,102 +27167,40 @@
           </a:p>
         </p:txBody>
       </p:sp>
-      <p:sp>
-        <p:nvSpPr>
-          <p:cNvPr id="4" name="Text Placeholder 3">
+      <p:pic>
+        <p:nvPicPr>
+          <p:cNvPr id="6" name="Picture 5">
             <a:extLst>
               <a:ext uri="{FF2B5EF4-FFF2-40B4-BE49-F238E27FC236}">
-                <a16:creationId xmlns:a16="http://schemas.microsoft.com/office/drawing/2014/main" id="{5E600BA7-FA45-884F-9820-9E5F2CB7AA48}"/>
+                <a16:creationId xmlns:a16="http://schemas.microsoft.com/office/drawing/2014/main" id="{4B9B5C17-6333-3542-BF92-961541BDC881}"/>
               </a:ext>
             </a:extLst>
           </p:cNvPr>
-          <p:cNvSpPr>
-            <a:spLocks noGrp="1"/>
-          </p:cNvSpPr>
-          <p:nvPr>
-            <p:ph type="body" idx="1"/>
-          </p:nvPr>
-        </p:nvSpPr>
-        <p:spPr/>
-        <p:txBody>
-          <a:bodyPr/>
-          <a:lstStyle/>
-          <a:p>
-            <a:r>
-              <a:rPr lang="en-US" dirty="0"/>
-              <a:t>The SVM loss function will find the “best” separating hyperplane overall, but perhaps we could draw a better hyperplane to separate just </a:t>
-            </a:r>
-            <a:r>
-              <a:rPr lang="en-US" i="1" dirty="0"/>
-              <a:t>k</a:t>
-            </a:r>
-            <a:r>
-              <a:rPr lang="en-US" dirty="0"/>
-              <a:t> positive examples?</a:t>
-            </a:r>
-            <a:br>
-              <a:rPr lang="en-US" dirty="0"/>
-            </a:br>
-            <a:endParaRPr lang="en-US" dirty="0"/>
-          </a:p>
-          <a:p>
-            <a:r>
-              <a:rPr lang="en-US" i="1" dirty="0" err="1"/>
-              <a:t>Transductive</a:t>
-            </a:r>
-            <a:r>
-              <a:rPr lang="en-US" dirty="0"/>
-              <a:t> method: needs to be aware of the test set </a:t>
-            </a:r>
-            <a:r>
-              <a:rPr lang="en-US" b="1" dirty="0"/>
-              <a:t>without labels</a:t>
-            </a:r>
-            <a:r>
-              <a:rPr lang="en-US" dirty="0"/>
-              <a:t> to select just </a:t>
-            </a:r>
-            <a:r>
-              <a:rPr lang="en-US" i="1" dirty="0"/>
-              <a:t>k</a:t>
-            </a:r>
-            <a:r>
-              <a:rPr lang="en-US" dirty="0"/>
-              <a:t> test examples.</a:t>
-            </a:r>
-            <a:br>
-              <a:rPr lang="en-US" dirty="0"/>
-            </a:br>
-            <a:endParaRPr lang="en-US" dirty="0"/>
-          </a:p>
-          <a:p>
-            <a:r>
-              <a:rPr lang="en-US" dirty="0"/>
-              <a:t>Modified gradient descent procedure to project gradient direction for L2-regularized SVM loss onto a “feasible solution cone” such that </a:t>
-            </a:r>
-            <a:r>
-              <a:rPr lang="en-US" u="sng" dirty="0"/>
-              <a:t>no more than</a:t>
-            </a:r>
-            <a:r>
-              <a:rPr lang="en-US" dirty="0"/>
-              <a:t> </a:t>
-            </a:r>
-            <a:r>
-              <a:rPr lang="en-US" i="1" dirty="0"/>
-              <a:t>k</a:t>
-            </a:r>
-            <a:r>
-              <a:rPr lang="en-US" dirty="0"/>
-              <a:t> test examples will be predicted positive after the step.</a:t>
-            </a:r>
-          </a:p>
-        </p:txBody>
-      </p:sp>
+          <p:cNvPicPr>
+            <a:picLocks noChangeAspect="1"/>
+          </p:cNvPicPr>
+          <p:nvPr/>
+        </p:nvPicPr>
+        <p:blipFill>
+          <a:blip r:embed="rId2"/>
+          <a:stretch>
+            <a:fillRect/>
+          </a:stretch>
+        </p:blipFill>
+        <p:spPr>
+          <a:xfrm>
+            <a:off x="1169439" y="1257300"/>
+            <a:ext cx="9853121" cy="5023746"/>
+          </a:xfrm>
+          <a:prstGeom prst="rect">
+            <a:avLst/>
+          </a:prstGeom>
+        </p:spPr>
+      </p:pic>
     </p:spTree>
     <p:extLst>
       <p:ext uri="{BB962C8B-B14F-4D97-AF65-F5344CB8AC3E}">
-        <p14:creationId xmlns:p14="http://schemas.microsoft.com/office/powerpoint/2010/main" val="94907443"/>
+        <p14:creationId xmlns:p14="http://schemas.microsoft.com/office/powerpoint/2010/main" val="1478637945"/>
       </p:ext>
     </p:extLst>
   </p:cSld>
@@ -27229,7 +27211,7 @@
 </file>
 
 <file path=ppt/slides/slide4.xml><?xml version="1.0" encoding="utf-8"?>
-<p:sld xmlns:a="http://schemas.openxmlformats.org/drawingml/2006/main" xmlns:r="http://schemas.openxmlformats.org/officeDocument/2006/relationships" xmlns:p="http://schemas.openxmlformats.org/presentationml/2006/main">
+<p:sld xmlns:a="http://schemas.openxmlformats.org/drawingml/2006/main" xmlns:r="http://schemas.openxmlformats.org/officeDocument/2006/relationships" xmlns:p="http://schemas.openxmlformats.org/presentationml/2006/main" show="0">
   <p:cSld>
     <p:spTree>
       <p:nvGrpSpPr>
@@ -27368,40 +27350,102 @@
           </a:p>
         </p:txBody>
       </p:sp>
-      <p:pic>
-        <p:nvPicPr>
-          <p:cNvPr id="2" name="Picture 1">
+      <p:sp>
+        <p:nvSpPr>
+          <p:cNvPr id="4" name="Text Placeholder 3">
             <a:extLst>
               <a:ext uri="{FF2B5EF4-FFF2-40B4-BE49-F238E27FC236}">
-                <a16:creationId xmlns:a16="http://schemas.microsoft.com/office/drawing/2014/main" id="{23F8960D-806C-F441-9A23-1578C38467D8}"/>
+                <a16:creationId xmlns:a16="http://schemas.microsoft.com/office/drawing/2014/main" id="{5E600BA7-FA45-884F-9820-9E5F2CB7AA48}"/>
               </a:ext>
             </a:extLst>
           </p:cNvPr>
-          <p:cNvPicPr>
-            <a:picLocks noChangeAspect="1"/>
-          </p:cNvPicPr>
-          <p:nvPr/>
-        </p:nvPicPr>
-        <p:blipFill>
-          <a:blip r:embed="rId2"/>
-          <a:stretch>
-            <a:fillRect/>
-          </a:stretch>
-        </p:blipFill>
-        <p:spPr>
-          <a:xfrm>
-            <a:off x="2749550" y="1371600"/>
-            <a:ext cx="6692900" cy="4114800"/>
-          </a:xfrm>
-          <a:prstGeom prst="rect">
-            <a:avLst/>
-          </a:prstGeom>
-        </p:spPr>
-      </p:pic>
+          <p:cNvSpPr>
+            <a:spLocks noGrp="1"/>
+          </p:cNvSpPr>
+          <p:nvPr>
+            <p:ph type="body" idx="1"/>
+          </p:nvPr>
+        </p:nvSpPr>
+        <p:spPr/>
+        <p:txBody>
+          <a:bodyPr/>
+          <a:lstStyle/>
+          <a:p>
+            <a:r>
+              <a:rPr lang="en-US" dirty="0"/>
+              <a:t>The SVM loss function will find the “best” separating hyperplane overall, but perhaps we could draw a better hyperplane to separate just </a:t>
+            </a:r>
+            <a:r>
+              <a:rPr lang="en-US" i="1" dirty="0"/>
+              <a:t>k</a:t>
+            </a:r>
+            <a:r>
+              <a:rPr lang="en-US" dirty="0"/>
+              <a:t> positive examples?</a:t>
+            </a:r>
+            <a:br>
+              <a:rPr lang="en-US" dirty="0"/>
+            </a:br>
+            <a:endParaRPr lang="en-US" dirty="0"/>
+          </a:p>
+          <a:p>
+            <a:r>
+              <a:rPr lang="en-US" i="1" dirty="0" err="1"/>
+              <a:t>Transductive</a:t>
+            </a:r>
+            <a:r>
+              <a:rPr lang="en-US" dirty="0"/>
+              <a:t> method: needs to be aware of the test set </a:t>
+            </a:r>
+            <a:r>
+              <a:rPr lang="en-US" b="1" dirty="0"/>
+              <a:t>without labels</a:t>
+            </a:r>
+            <a:r>
+              <a:rPr lang="en-US" dirty="0"/>
+              <a:t> to select just </a:t>
+            </a:r>
+            <a:r>
+              <a:rPr lang="en-US" i="1" dirty="0"/>
+              <a:t>k</a:t>
+            </a:r>
+            <a:r>
+              <a:rPr lang="en-US" dirty="0"/>
+              <a:t> test examples.</a:t>
+            </a:r>
+            <a:br>
+              <a:rPr lang="en-US" dirty="0"/>
+            </a:br>
+            <a:endParaRPr lang="en-US" dirty="0"/>
+          </a:p>
+          <a:p>
+            <a:r>
+              <a:rPr lang="en-US" dirty="0"/>
+              <a:t>Modified gradient descent procedure to project gradient direction for L2-regularized SVM loss onto a “feasible solution cone” such that </a:t>
+            </a:r>
+            <a:r>
+              <a:rPr lang="en-US" u="sng" dirty="0"/>
+              <a:t>no more than</a:t>
+            </a:r>
+            <a:r>
+              <a:rPr lang="en-US" dirty="0"/>
+              <a:t> </a:t>
+            </a:r>
+            <a:r>
+              <a:rPr lang="en-US" i="1" dirty="0"/>
+              <a:t>k</a:t>
+            </a:r>
+            <a:r>
+              <a:rPr lang="en-US" dirty="0"/>
+              <a:t> test examples will be predicted positive after the step.</a:t>
+            </a:r>
+          </a:p>
+        </p:txBody>
+      </p:sp>
     </p:spTree>
     <p:extLst>
       <p:ext uri="{BB962C8B-B14F-4D97-AF65-F5344CB8AC3E}">
-        <p14:creationId xmlns:p14="http://schemas.microsoft.com/office/powerpoint/2010/main" val="1715242992"/>
+        <p14:creationId xmlns:p14="http://schemas.microsoft.com/office/powerpoint/2010/main" val="94907443"/>
       </p:ext>
     </p:extLst>
   </p:cSld>
@@ -27456,6 +27500,94 @@
           </a:p>
         </p:txBody>
       </p:sp>
+      <p:pic>
+        <p:nvPicPr>
+          <p:cNvPr id="2" name="Picture 1">
+            <a:extLst>
+              <a:ext uri="{FF2B5EF4-FFF2-40B4-BE49-F238E27FC236}">
+                <a16:creationId xmlns:a16="http://schemas.microsoft.com/office/drawing/2014/main" id="{23F8960D-806C-F441-9A23-1578C38467D8}"/>
+              </a:ext>
+            </a:extLst>
+          </p:cNvPr>
+          <p:cNvPicPr>
+            <a:picLocks noChangeAspect="1"/>
+          </p:cNvPicPr>
+          <p:nvPr/>
+        </p:nvPicPr>
+        <p:blipFill>
+          <a:blip r:embed="rId2"/>
+          <a:stretch>
+            <a:fillRect/>
+          </a:stretch>
+        </p:blipFill>
+        <p:spPr>
+          <a:xfrm>
+            <a:off x="2749550" y="1371600"/>
+            <a:ext cx="6692900" cy="4114800"/>
+          </a:xfrm>
+          <a:prstGeom prst="rect">
+            <a:avLst/>
+          </a:prstGeom>
+        </p:spPr>
+      </p:pic>
+    </p:spTree>
+    <p:extLst>
+      <p:ext uri="{BB962C8B-B14F-4D97-AF65-F5344CB8AC3E}">
+        <p14:creationId xmlns:p14="http://schemas.microsoft.com/office/powerpoint/2010/main" val="1715242992"/>
+      </p:ext>
+    </p:extLst>
+  </p:cSld>
+  <p:clrMapOvr>
+    <a:masterClrMapping/>
+  </p:clrMapOvr>
+</p:sld>
+</file>
+
+<file path=ppt/slides/slide42.xml><?xml version="1.0" encoding="utf-8"?>
+<p:sld xmlns:a="http://schemas.openxmlformats.org/drawingml/2006/main" xmlns:r="http://schemas.openxmlformats.org/officeDocument/2006/relationships" xmlns:p="http://schemas.openxmlformats.org/presentationml/2006/main" show="0">
+  <p:cSld>
+    <p:spTree>
+      <p:nvGrpSpPr>
+        <p:cNvPr id="1" name=""/>
+        <p:cNvGrpSpPr/>
+        <p:nvPr/>
+      </p:nvGrpSpPr>
+      <p:grpSpPr>
+        <a:xfrm>
+          <a:off x="0" y="0"/>
+          <a:ext cx="0" cy="0"/>
+          <a:chOff x="0" y="0"/>
+          <a:chExt cx="0" cy="0"/>
+        </a:xfrm>
+      </p:grpSpPr>
+      <p:sp>
+        <p:nvSpPr>
+          <p:cNvPr id="3" name="Title 2">
+            <a:extLst>
+              <a:ext uri="{FF2B5EF4-FFF2-40B4-BE49-F238E27FC236}">
+                <a16:creationId xmlns:a16="http://schemas.microsoft.com/office/drawing/2014/main" id="{9323871C-7CA8-1448-8FFC-1AE6E1838941}"/>
+              </a:ext>
+            </a:extLst>
+          </p:cNvPr>
+          <p:cNvSpPr>
+            <a:spLocks noGrp="1"/>
+          </p:cNvSpPr>
+          <p:nvPr>
+            <p:ph type="title"/>
+          </p:nvPr>
+        </p:nvSpPr>
+        <p:spPr/>
+        <p:txBody>
+          <a:bodyPr/>
+          <a:lstStyle/>
+          <a:p>
+            <a:r>
+              <a:rPr lang="en-US" dirty="0"/>
+              <a:t>Some Open Research Questions</a:t>
+            </a:r>
+          </a:p>
+        </p:txBody>
+      </p:sp>
       <p:sp>
         <p:nvSpPr>
           <p:cNvPr id="4" name="Text Placeholder 3">
@@ -27569,7 +27701,7 @@
 </p:sld>
 </file>
 
-<file path=ppt/slides/slide42.xml><?xml version="1.0" encoding="utf-8"?>
+<file path=ppt/slides/slide43.xml><?xml version="1.0" encoding="utf-8"?>
 <p:sld xmlns:a="http://schemas.openxmlformats.org/drawingml/2006/main" xmlns:r="http://schemas.openxmlformats.org/officeDocument/2006/relationships" xmlns:p="http://schemas.openxmlformats.org/presentationml/2006/main" show="0">
   <p:cSld>
     <p:spTree>
@@ -27635,7 +27767,7 @@
 </p:sld>
 </file>
 
-<file path=ppt/slides/slide43.xml><?xml version="1.0" encoding="utf-8"?>
+<file path=ppt/slides/slide44.xml><?xml version="1.0" encoding="utf-8"?>
 <p:sld xmlns:a="http://schemas.openxmlformats.org/drawingml/2006/main" xmlns:r="http://schemas.openxmlformats.org/officeDocument/2006/relationships" xmlns:p="http://schemas.openxmlformats.org/presentationml/2006/main" show="0">
   <p:cSld>
     <p:spTree>
@@ -28477,7 +28609,7 @@
 </p:sld>
 </file>
 
-<file path=ppt/slides/slide44.xml><?xml version="1.0" encoding="utf-8"?>
+<file path=ppt/slides/slide45.xml><?xml version="1.0" encoding="utf-8"?>
 <p:sld xmlns:a="http://schemas.openxmlformats.org/drawingml/2006/main" xmlns:r="http://schemas.openxmlformats.org/officeDocument/2006/relationships" xmlns:p="http://schemas.openxmlformats.org/presentationml/2006/main" show="0">
   <p:cSld>
     <p:spTree>
@@ -28601,594 +28733,6 @@
     <p:extLst>
       <p:ext uri="{BB962C8B-B14F-4D97-AF65-F5344CB8AC3E}">
         <p14:creationId xmlns:p14="http://schemas.microsoft.com/office/powerpoint/2010/main" val="462557737"/>
-      </p:ext>
-    </p:extLst>
-  </p:cSld>
-  <p:clrMapOvr>
-    <a:masterClrMapping/>
-  </p:clrMapOvr>
-</p:sld>
-</file>
-
-<file path=ppt/slides/slide45.xml><?xml version="1.0" encoding="utf-8"?>
-<p:sld xmlns:a="http://schemas.openxmlformats.org/drawingml/2006/main" xmlns:r="http://schemas.openxmlformats.org/officeDocument/2006/relationships" xmlns:p="http://schemas.openxmlformats.org/presentationml/2006/main" show="0">
-  <p:cSld>
-    <p:spTree>
-      <p:nvGrpSpPr>
-        <p:cNvPr id="1" name="Shape 93"/>
-        <p:cNvGrpSpPr/>
-        <p:nvPr/>
-      </p:nvGrpSpPr>
-      <p:grpSpPr>
-        <a:xfrm>
-          <a:off x="0" y="0"/>
-          <a:ext cx="0" cy="0"/>
-          <a:chOff x="0" y="0"/>
-          <a:chExt cx="0" cy="0"/>
-        </a:xfrm>
-      </p:grpSpPr>
-      <p:sp>
-        <p:nvSpPr>
-          <p:cNvPr id="94" name="Google Shape;94;p5"/>
-          <p:cNvSpPr txBox="1"/>
-          <p:nvPr/>
-        </p:nvSpPr>
-        <p:spPr>
-          <a:xfrm>
-            <a:off x="1981200" y="5624513"/>
-            <a:ext cx="2133600" cy="273900"/>
-          </a:xfrm>
-          <a:prstGeom prst="rect">
-            <a:avLst/>
-          </a:prstGeom>
-          <a:noFill/>
-          <a:ln>
-            <a:noFill/>
-          </a:ln>
-        </p:spPr>
-        <p:txBody>
-          <a:bodyPr spcFirstLastPara="1" wrap="square" lIns="91425" tIns="91425" rIns="91425" bIns="91425" anchor="ctr" anchorCtr="0">
-            <a:noAutofit/>
-          </a:bodyPr>
-          <a:lstStyle/>
-          <a:p>
-            <a:pPr marL="0" marR="0" lvl="0" indent="0" algn="l" rtl="0">
-              <a:spcBef>
-                <a:spcPts val="0"/>
-              </a:spcBef>
-              <a:spcAft>
-                <a:spcPts val="0"/>
-              </a:spcAft>
-              <a:buNone/>
-            </a:pPr>
-            <a:endParaRPr sz="2400" b="0" i="0" u="none" strike="noStrike" cap="none">
-              <a:solidFill>
-                <a:srgbClr val="000000"/>
-              </a:solidFill>
-              <a:latin typeface="Calibri"/>
-              <a:ea typeface="Calibri"/>
-              <a:cs typeface="Calibri"/>
-              <a:sym typeface="Calibri"/>
-            </a:endParaRPr>
-          </a:p>
-        </p:txBody>
-      </p:sp>
-      <p:sp>
-        <p:nvSpPr>
-          <p:cNvPr id="95" name="Google Shape;95;p5"/>
-          <p:cNvSpPr txBox="1"/>
-          <p:nvPr/>
-        </p:nvSpPr>
-        <p:spPr>
-          <a:xfrm>
-            <a:off x="4648200" y="5624513"/>
-            <a:ext cx="2895600" cy="273900"/>
-          </a:xfrm>
-          <a:prstGeom prst="rect">
-            <a:avLst/>
-          </a:prstGeom>
-          <a:noFill/>
-          <a:ln>
-            <a:noFill/>
-          </a:ln>
-        </p:spPr>
-        <p:txBody>
-          <a:bodyPr spcFirstLastPara="1" wrap="square" lIns="91425" tIns="91425" rIns="91425" bIns="91425" anchor="ctr" anchorCtr="0">
-            <a:noAutofit/>
-          </a:bodyPr>
-          <a:lstStyle/>
-          <a:p>
-            <a:pPr marL="0" marR="0" lvl="0" indent="0" algn="ctr" rtl="0">
-              <a:spcBef>
-                <a:spcPts val="0"/>
-              </a:spcBef>
-              <a:spcAft>
-                <a:spcPts val="0"/>
-              </a:spcAft>
-              <a:buNone/>
-            </a:pPr>
-            <a:endParaRPr sz="2400" b="0" i="0" u="none" strike="noStrike" cap="none">
-              <a:solidFill>
-                <a:srgbClr val="000000"/>
-              </a:solidFill>
-              <a:latin typeface="Calibri"/>
-              <a:ea typeface="Calibri"/>
-              <a:cs typeface="Calibri"/>
-              <a:sym typeface="Calibri"/>
-            </a:endParaRPr>
-          </a:p>
-        </p:txBody>
-      </p:sp>
-      <p:sp>
-        <p:nvSpPr>
-          <p:cNvPr id="96" name="Google Shape;96;p5"/>
-          <p:cNvSpPr txBox="1"/>
-          <p:nvPr/>
-        </p:nvSpPr>
-        <p:spPr>
-          <a:xfrm>
-            <a:off x="8077200" y="5624513"/>
-            <a:ext cx="2133600" cy="273900"/>
-          </a:xfrm>
-          <a:prstGeom prst="rect">
-            <a:avLst/>
-          </a:prstGeom>
-          <a:noFill/>
-          <a:ln>
-            <a:noFill/>
-          </a:ln>
-        </p:spPr>
-        <p:txBody>
-          <a:bodyPr spcFirstLastPara="1" wrap="square" lIns="91425" tIns="45700" rIns="91425" bIns="45700" anchor="ctr" anchorCtr="0">
-            <a:noAutofit/>
-          </a:bodyPr>
-          <a:lstStyle/>
-          <a:p>
-            <a:pPr marL="0" marR="0" lvl="0" indent="0" algn="r" rtl="0">
-              <a:spcBef>
-                <a:spcPts val="0"/>
-              </a:spcBef>
-              <a:spcAft>
-                <a:spcPts val="0"/>
-              </a:spcAft>
-              <a:buNone/>
-            </a:pPr>
-            <a:fld id="{00000000-1234-1234-1234-123412341234}" type="slidenum">
-              <a:rPr lang="en-US" sz="1200" b="0" i="0" u="none" strike="noStrike" cap="none">
-                <a:solidFill>
-                  <a:srgbClr val="888888"/>
-                </a:solidFill>
-                <a:latin typeface="Calibri"/>
-                <a:ea typeface="Calibri"/>
-                <a:cs typeface="Calibri"/>
-                <a:sym typeface="Calibri"/>
-              </a:rPr>
-              <a:t>45</a:t>
-            </a:fld>
-            <a:endParaRPr sz="1200" b="0" i="0" u="none" strike="noStrike" cap="none">
-              <a:solidFill>
-                <a:srgbClr val="888888"/>
-              </a:solidFill>
-              <a:latin typeface="Calibri"/>
-              <a:ea typeface="Calibri"/>
-              <a:cs typeface="Calibri"/>
-              <a:sym typeface="Calibri"/>
-            </a:endParaRPr>
-          </a:p>
-        </p:txBody>
-      </p:sp>
-      <p:sp>
-        <p:nvSpPr>
-          <p:cNvPr id="97" name="Google Shape;97;p5"/>
-          <p:cNvSpPr txBox="1"/>
-          <p:nvPr/>
-        </p:nvSpPr>
-        <p:spPr>
-          <a:xfrm>
-            <a:off x="1526024" y="5700726"/>
-            <a:ext cx="9144000" cy="273900"/>
-          </a:xfrm>
-          <a:prstGeom prst="rect">
-            <a:avLst/>
-          </a:prstGeom>
-          <a:noFill/>
-          <a:ln>
-            <a:noFill/>
-          </a:ln>
-        </p:spPr>
-        <p:txBody>
-          <a:bodyPr spcFirstLastPara="1" wrap="square" lIns="91425" tIns="45700" rIns="91425" bIns="45700" anchor="ctr" anchorCtr="0">
-            <a:noAutofit/>
-          </a:bodyPr>
-          <a:lstStyle/>
-          <a:p>
-            <a:pPr marL="0" marR="0" lvl="0" indent="0" algn="ctr" rtl="0">
-              <a:spcBef>
-                <a:spcPts val="0"/>
-              </a:spcBef>
-              <a:spcAft>
-                <a:spcPts val="0"/>
-              </a:spcAft>
-              <a:buNone/>
-            </a:pPr>
-            <a:r>
-              <a:rPr lang="en-US" sz="1200" b="0" i="0" u="none" strike="noStrike" cap="none">
-                <a:solidFill>
-                  <a:srgbClr val="FFFFFF"/>
-                </a:solidFill>
-                <a:latin typeface="Calibri"/>
-                <a:ea typeface="Calibri"/>
-                <a:cs typeface="Calibri"/>
-                <a:sym typeface="Calibri"/>
-              </a:rPr>
-              <a:t>Center for Data Science and Public Policy</a:t>
-            </a:r>
-            <a:br>
-              <a:rPr lang="en-US" sz="1200" b="0" i="0" u="none" strike="noStrike" cap="none">
-                <a:solidFill>
-                  <a:srgbClr val="FFFFFF"/>
-                </a:solidFill>
-                <a:latin typeface="Calibri"/>
-                <a:ea typeface="Calibri"/>
-                <a:cs typeface="Calibri"/>
-                <a:sym typeface="Calibri"/>
-              </a:rPr>
-            </a:br>
-            <a:r>
-              <a:rPr lang="en-US" sz="1200" b="0" i="0" u="none" strike="noStrike" cap="none">
-                <a:solidFill>
-                  <a:srgbClr val="FFFFFF"/>
-                </a:solidFill>
-                <a:latin typeface="Calibri"/>
-                <a:ea typeface="Calibri"/>
-                <a:cs typeface="Calibri"/>
-                <a:sym typeface="Calibri"/>
-              </a:rPr>
-              <a:t>University of Chicago</a:t>
-            </a:r>
-            <a:endParaRPr/>
-          </a:p>
-          <a:p>
-            <a:pPr marL="0" marR="0" lvl="0" indent="0" algn="ctr" rtl="0">
-              <a:spcBef>
-                <a:spcPts val="0"/>
-              </a:spcBef>
-              <a:spcAft>
-                <a:spcPts val="0"/>
-              </a:spcAft>
-              <a:buNone/>
-            </a:pPr>
-            <a:endParaRPr sz="1200" b="0" i="0" u="none" strike="noStrike" cap="none">
-              <a:solidFill>
-                <a:srgbClr val="FFFFFF"/>
-              </a:solidFill>
-              <a:latin typeface="Calibri"/>
-              <a:ea typeface="Calibri"/>
-              <a:cs typeface="Calibri"/>
-              <a:sym typeface="Calibri"/>
-            </a:endParaRPr>
-          </a:p>
-        </p:txBody>
-      </p:sp>
-      <p:sp>
-        <p:nvSpPr>
-          <p:cNvPr id="98" name="Google Shape;98;p5"/>
-          <p:cNvSpPr txBox="1"/>
-          <p:nvPr/>
-        </p:nvSpPr>
-        <p:spPr>
-          <a:xfrm>
-            <a:off x="1739600" y="5624526"/>
-            <a:ext cx="1592400" cy="273900"/>
-          </a:xfrm>
-          <a:prstGeom prst="rect">
-            <a:avLst/>
-          </a:prstGeom>
-          <a:noFill/>
-          <a:ln>
-            <a:noFill/>
-          </a:ln>
-        </p:spPr>
-        <p:txBody>
-          <a:bodyPr spcFirstLastPara="1" wrap="square" lIns="91425" tIns="45700" rIns="91425" bIns="45700" anchor="ctr" anchorCtr="0">
-            <a:noAutofit/>
-          </a:bodyPr>
-          <a:lstStyle/>
-          <a:p>
-            <a:pPr marL="0" marR="0" lvl="0" indent="0" algn="l" rtl="0">
-              <a:spcBef>
-                <a:spcPts val="0"/>
-              </a:spcBef>
-              <a:spcAft>
-                <a:spcPts val="0"/>
-              </a:spcAft>
-              <a:buNone/>
-            </a:pPr>
-            <a:r>
-              <a:rPr lang="en-US" sz="1200" b="0" i="0" u="none" strike="noStrike" cap="none">
-                <a:solidFill>
-                  <a:srgbClr val="FFFFFF"/>
-                </a:solidFill>
-                <a:latin typeface="Calibri"/>
-                <a:ea typeface="Calibri"/>
-                <a:cs typeface="Calibri"/>
-                <a:sym typeface="Calibri"/>
-              </a:rPr>
-              <a:t>dsapp.uchicago.edu</a:t>
-            </a:r>
-            <a:endParaRPr/>
-          </a:p>
-        </p:txBody>
-      </p:sp>
-      <p:sp>
-        <p:nvSpPr>
-          <p:cNvPr id="99" name="Google Shape;99;p5"/>
-          <p:cNvSpPr txBox="1"/>
-          <p:nvPr/>
-        </p:nvSpPr>
-        <p:spPr>
-          <a:xfrm>
-            <a:off x="8906233" y="5624513"/>
-            <a:ext cx="1304700" cy="273900"/>
-          </a:xfrm>
-          <a:prstGeom prst="rect">
-            <a:avLst/>
-          </a:prstGeom>
-          <a:noFill/>
-          <a:ln>
-            <a:noFill/>
-          </a:ln>
-        </p:spPr>
-        <p:txBody>
-          <a:bodyPr spcFirstLastPara="1" wrap="square" lIns="91425" tIns="45700" rIns="91425" bIns="45700" anchor="ctr" anchorCtr="0">
-            <a:noAutofit/>
-          </a:bodyPr>
-          <a:lstStyle/>
-          <a:p>
-            <a:pPr marL="0" marR="0" lvl="0" indent="0" algn="r" rtl="0">
-              <a:spcBef>
-                <a:spcPts val="0"/>
-              </a:spcBef>
-              <a:spcAft>
-                <a:spcPts val="0"/>
-              </a:spcAft>
-              <a:buNone/>
-            </a:pPr>
-            <a:r>
-              <a:rPr lang="en-US" sz="1200" b="0" i="0" u="none" strike="noStrike" cap="none">
-                <a:solidFill>
-                  <a:srgbClr val="FFFFFF"/>
-                </a:solidFill>
-                <a:latin typeface="Calibri"/>
-                <a:ea typeface="Calibri"/>
-                <a:cs typeface="Calibri"/>
-                <a:sym typeface="Calibri"/>
-              </a:rPr>
-              <a:t>@datascifellows</a:t>
-            </a:r>
-            <a:endParaRPr/>
-          </a:p>
-        </p:txBody>
-      </p:sp>
-      <p:sp>
-        <p:nvSpPr>
-          <p:cNvPr id="100" name="Google Shape;100;p5"/>
-          <p:cNvSpPr txBox="1">
-            <a:spLocks noGrp="1"/>
-          </p:cNvSpPr>
-          <p:nvPr>
-            <p:ph type="body" idx="1"/>
-          </p:nvPr>
-        </p:nvSpPr>
-        <p:spPr>
-          <a:xfrm>
-            <a:off x="415600" y="1536625"/>
-            <a:ext cx="8421900" cy="5060700"/>
-          </a:xfrm>
-          <a:prstGeom prst="rect">
-            <a:avLst/>
-          </a:prstGeom>
-          <a:noFill/>
-          <a:ln>
-            <a:noFill/>
-          </a:ln>
-        </p:spPr>
-        <p:txBody>
-          <a:bodyPr spcFirstLastPara="1" wrap="square" lIns="91425" tIns="91425" rIns="91425" bIns="91425" anchor="t" anchorCtr="0">
-            <a:noAutofit/>
-          </a:bodyPr>
-          <a:lstStyle/>
-          <a:p>
-            <a:pPr marL="457189" lvl="0" indent="-228594" algn="l" rtl="0">
-              <a:spcBef>
-                <a:spcPts val="0"/>
-              </a:spcBef>
-              <a:spcAft>
-                <a:spcPts val="0"/>
-              </a:spcAft>
-              <a:buClr>
-                <a:schemeClr val="dk1"/>
-              </a:buClr>
-              <a:buSzPts val="2800"/>
-              <a:buAutoNum type="arabicPeriod"/>
-            </a:pPr>
-            <a:r>
-              <a:rPr lang="en-US" sz="2800" b="1" dirty="0"/>
-              <a:t> Goals</a:t>
-            </a:r>
-            <a:r>
-              <a:rPr lang="en-US" sz="2800" dirty="0"/>
-              <a:t>: Define the goal(s) of the project</a:t>
-            </a:r>
-            <a:br>
-              <a:rPr lang="en-US" sz="2800" dirty="0"/>
-            </a:br>
-            <a:endParaRPr sz="1200" dirty="0"/>
-          </a:p>
-          <a:p>
-            <a:pPr marL="457189" lvl="0" indent="-228594" algn="l" rtl="0">
-              <a:spcBef>
-                <a:spcPts val="560"/>
-              </a:spcBef>
-              <a:spcAft>
-                <a:spcPts val="0"/>
-              </a:spcAft>
-              <a:buClr>
-                <a:schemeClr val="dk1"/>
-              </a:buClr>
-              <a:buSzPts val="2800"/>
-              <a:buAutoNum type="arabicPeriod"/>
-            </a:pPr>
-            <a:r>
-              <a:rPr lang="en-US" sz="2800" b="1" dirty="0"/>
-              <a:t> Actions</a:t>
-            </a:r>
-            <a:r>
-              <a:rPr lang="en-US" sz="2800" dirty="0"/>
-              <a:t>: What actions/interventions will you inform?</a:t>
-            </a:r>
-            <a:br>
-              <a:rPr lang="en-US" sz="2800" dirty="0"/>
-            </a:br>
-            <a:endParaRPr sz="1200" dirty="0"/>
-          </a:p>
-          <a:p>
-            <a:pPr marL="457189" lvl="0" indent="-228594" algn="l" rtl="0">
-              <a:spcBef>
-                <a:spcPts val="560"/>
-              </a:spcBef>
-              <a:spcAft>
-                <a:spcPts val="0"/>
-              </a:spcAft>
-              <a:buClr>
-                <a:schemeClr val="dk1"/>
-              </a:buClr>
-              <a:buSzPts val="2800"/>
-              <a:buAutoNum type="arabicPeriod"/>
-            </a:pPr>
-            <a:r>
-              <a:rPr lang="en-US" sz="2800" b="1" dirty="0"/>
-              <a:t> Data</a:t>
-            </a:r>
-            <a:r>
-              <a:rPr lang="en-US" sz="2800" dirty="0"/>
-              <a:t>: What data do you have internally? What data do you need? What can you augment from external and public sources?</a:t>
-            </a:r>
-            <a:br>
-              <a:rPr lang="en-US" sz="2800" dirty="0"/>
-            </a:br>
-            <a:endParaRPr sz="1200" dirty="0"/>
-          </a:p>
-          <a:p>
-            <a:pPr marL="457189" lvl="0" indent="-228594" algn="l" rtl="0">
-              <a:spcBef>
-                <a:spcPts val="560"/>
-              </a:spcBef>
-              <a:spcAft>
-                <a:spcPts val="0"/>
-              </a:spcAft>
-              <a:buClr>
-                <a:schemeClr val="dk1"/>
-              </a:buClr>
-              <a:buSzPts val="2800"/>
-              <a:buAutoNum type="arabicPeriod"/>
-            </a:pPr>
-            <a:r>
-              <a:rPr lang="en-US" sz="2800" b="1" dirty="0"/>
-              <a:t> Analysis</a:t>
-            </a:r>
-            <a:r>
-              <a:rPr lang="en-US" sz="2800" dirty="0"/>
-              <a:t>: What analysis needs to be done? </a:t>
-            </a:r>
-            <a:br>
-              <a:rPr lang="en-US" sz="2800" dirty="0"/>
-            </a:br>
-            <a:r>
-              <a:rPr lang="en-US" sz="2800" dirty="0"/>
-              <a:t>How will it be validated?</a:t>
-            </a:r>
-            <a:endParaRPr dirty="0"/>
-          </a:p>
-        </p:txBody>
-      </p:sp>
-      <p:sp>
-        <p:nvSpPr>
-          <p:cNvPr id="101" name="Google Shape;101;p5"/>
-          <p:cNvSpPr txBox="1">
-            <a:spLocks noGrp="1"/>
-          </p:cNvSpPr>
-          <p:nvPr>
-            <p:ph type="title"/>
-          </p:nvPr>
-        </p:nvSpPr>
-        <p:spPr>
-          <a:xfrm>
-            <a:off x="415600" y="-1"/>
-            <a:ext cx="11360700" cy="973449"/>
-          </a:xfrm>
-          <a:prstGeom prst="rect">
-            <a:avLst/>
-          </a:prstGeom>
-          <a:noFill/>
-          <a:ln>
-            <a:noFill/>
-          </a:ln>
-        </p:spPr>
-        <p:txBody>
-          <a:bodyPr spcFirstLastPara="1" wrap="square" lIns="91425" tIns="91425" rIns="91425" bIns="91425" anchor="ctr" anchorCtr="0">
-            <a:noAutofit/>
-          </a:bodyPr>
-          <a:lstStyle/>
-          <a:p>
-            <a:pPr marL="0" lvl="0" indent="0" algn="ctr" rtl="0">
-              <a:spcBef>
-                <a:spcPts val="0"/>
-              </a:spcBef>
-              <a:spcAft>
-                <a:spcPts val="0"/>
-              </a:spcAft>
-              <a:buNone/>
-            </a:pPr>
-            <a:r>
-              <a:rPr lang="en-US" sz="4600" dirty="0"/>
-              <a:t>Actionable and Goal-Driven Project Scope</a:t>
-            </a:r>
-            <a:endParaRPr sz="4600" dirty="0"/>
-          </a:p>
-        </p:txBody>
-      </p:sp>
-      <p:pic>
-        <p:nvPicPr>
-          <p:cNvPr id="102" name="Google Shape;102;p5"/>
-          <p:cNvPicPr preferRelativeResize="0"/>
-          <p:nvPr/>
-        </p:nvPicPr>
-        <p:blipFill rotWithShape="1">
-          <a:blip r:embed="rId3">
-            <a:alphaModFix/>
-          </a:blip>
-          <a:srcRect/>
-          <a:stretch/>
-        </p:blipFill>
-        <p:spPr>
-          <a:xfrm>
-            <a:off x="8906232" y="1993197"/>
-            <a:ext cx="3068139" cy="3068139"/>
-          </a:xfrm>
-          <a:prstGeom prst="rect">
-            <a:avLst/>
-          </a:prstGeom>
-          <a:noFill/>
-          <a:ln>
-            <a:noFill/>
-          </a:ln>
-        </p:spPr>
-      </p:pic>
-    </p:spTree>
-    <p:extLst>
-      <p:ext uri="{BB962C8B-B14F-4D97-AF65-F5344CB8AC3E}">
-        <p14:creationId xmlns:p14="http://schemas.microsoft.com/office/powerpoint/2010/main" val="2436022473"/>
       </p:ext>
     </p:extLst>
   </p:cSld>
@@ -29560,6 +29104,594 @@
       </p:sp>
       <p:sp>
         <p:nvSpPr>
+          <p:cNvPr id="100" name="Google Shape;100;p5"/>
+          <p:cNvSpPr txBox="1">
+            <a:spLocks noGrp="1"/>
+          </p:cNvSpPr>
+          <p:nvPr>
+            <p:ph type="body" idx="1"/>
+          </p:nvPr>
+        </p:nvSpPr>
+        <p:spPr>
+          <a:xfrm>
+            <a:off x="415600" y="1536625"/>
+            <a:ext cx="8421900" cy="5060700"/>
+          </a:xfrm>
+          <a:prstGeom prst="rect">
+            <a:avLst/>
+          </a:prstGeom>
+          <a:noFill/>
+          <a:ln>
+            <a:noFill/>
+          </a:ln>
+        </p:spPr>
+        <p:txBody>
+          <a:bodyPr spcFirstLastPara="1" wrap="square" lIns="91425" tIns="91425" rIns="91425" bIns="91425" anchor="t" anchorCtr="0">
+            <a:noAutofit/>
+          </a:bodyPr>
+          <a:lstStyle/>
+          <a:p>
+            <a:pPr marL="457189" lvl="0" indent="-228594" algn="l" rtl="0">
+              <a:spcBef>
+                <a:spcPts val="0"/>
+              </a:spcBef>
+              <a:spcAft>
+                <a:spcPts val="0"/>
+              </a:spcAft>
+              <a:buClr>
+                <a:schemeClr val="dk1"/>
+              </a:buClr>
+              <a:buSzPts val="2800"/>
+              <a:buAutoNum type="arabicPeriod"/>
+            </a:pPr>
+            <a:r>
+              <a:rPr lang="en-US" sz="2800" b="1" dirty="0"/>
+              <a:t> Goals</a:t>
+            </a:r>
+            <a:r>
+              <a:rPr lang="en-US" sz="2800" dirty="0"/>
+              <a:t>: Define the goal(s) of the project</a:t>
+            </a:r>
+            <a:br>
+              <a:rPr lang="en-US" sz="2800" dirty="0"/>
+            </a:br>
+            <a:endParaRPr sz="1200" dirty="0"/>
+          </a:p>
+          <a:p>
+            <a:pPr marL="457189" lvl="0" indent="-228594" algn="l" rtl="0">
+              <a:spcBef>
+                <a:spcPts val="560"/>
+              </a:spcBef>
+              <a:spcAft>
+                <a:spcPts val="0"/>
+              </a:spcAft>
+              <a:buClr>
+                <a:schemeClr val="dk1"/>
+              </a:buClr>
+              <a:buSzPts val="2800"/>
+              <a:buAutoNum type="arabicPeriod"/>
+            </a:pPr>
+            <a:r>
+              <a:rPr lang="en-US" sz="2800" b="1" dirty="0"/>
+              <a:t> Actions</a:t>
+            </a:r>
+            <a:r>
+              <a:rPr lang="en-US" sz="2800" dirty="0"/>
+              <a:t>: What actions/interventions will you inform?</a:t>
+            </a:r>
+            <a:br>
+              <a:rPr lang="en-US" sz="2800" dirty="0"/>
+            </a:br>
+            <a:endParaRPr sz="1200" dirty="0"/>
+          </a:p>
+          <a:p>
+            <a:pPr marL="457189" lvl="0" indent="-228594" algn="l" rtl="0">
+              <a:spcBef>
+                <a:spcPts val="560"/>
+              </a:spcBef>
+              <a:spcAft>
+                <a:spcPts val="0"/>
+              </a:spcAft>
+              <a:buClr>
+                <a:schemeClr val="dk1"/>
+              </a:buClr>
+              <a:buSzPts val="2800"/>
+              <a:buAutoNum type="arabicPeriod"/>
+            </a:pPr>
+            <a:r>
+              <a:rPr lang="en-US" sz="2800" b="1" dirty="0"/>
+              <a:t> Data</a:t>
+            </a:r>
+            <a:r>
+              <a:rPr lang="en-US" sz="2800" dirty="0"/>
+              <a:t>: What data do you have internally? What data do you need? What can you augment from external and public sources?</a:t>
+            </a:r>
+            <a:br>
+              <a:rPr lang="en-US" sz="2800" dirty="0"/>
+            </a:br>
+            <a:endParaRPr sz="1200" dirty="0"/>
+          </a:p>
+          <a:p>
+            <a:pPr marL="457189" lvl="0" indent="-228594" algn="l" rtl="0">
+              <a:spcBef>
+                <a:spcPts val="560"/>
+              </a:spcBef>
+              <a:spcAft>
+                <a:spcPts val="0"/>
+              </a:spcAft>
+              <a:buClr>
+                <a:schemeClr val="dk1"/>
+              </a:buClr>
+              <a:buSzPts val="2800"/>
+              <a:buAutoNum type="arabicPeriod"/>
+            </a:pPr>
+            <a:r>
+              <a:rPr lang="en-US" sz="2800" b="1" dirty="0"/>
+              <a:t> Analysis</a:t>
+            </a:r>
+            <a:r>
+              <a:rPr lang="en-US" sz="2800" dirty="0"/>
+              <a:t>: What analysis needs to be done? </a:t>
+            </a:r>
+            <a:br>
+              <a:rPr lang="en-US" sz="2800" dirty="0"/>
+            </a:br>
+            <a:r>
+              <a:rPr lang="en-US" sz="2800" dirty="0"/>
+              <a:t>How will it be validated?</a:t>
+            </a:r>
+            <a:endParaRPr dirty="0"/>
+          </a:p>
+        </p:txBody>
+      </p:sp>
+      <p:sp>
+        <p:nvSpPr>
+          <p:cNvPr id="101" name="Google Shape;101;p5"/>
+          <p:cNvSpPr txBox="1">
+            <a:spLocks noGrp="1"/>
+          </p:cNvSpPr>
+          <p:nvPr>
+            <p:ph type="title"/>
+          </p:nvPr>
+        </p:nvSpPr>
+        <p:spPr>
+          <a:xfrm>
+            <a:off x="415600" y="-1"/>
+            <a:ext cx="11360700" cy="973449"/>
+          </a:xfrm>
+          <a:prstGeom prst="rect">
+            <a:avLst/>
+          </a:prstGeom>
+          <a:noFill/>
+          <a:ln>
+            <a:noFill/>
+          </a:ln>
+        </p:spPr>
+        <p:txBody>
+          <a:bodyPr spcFirstLastPara="1" wrap="square" lIns="91425" tIns="91425" rIns="91425" bIns="91425" anchor="ctr" anchorCtr="0">
+            <a:noAutofit/>
+          </a:bodyPr>
+          <a:lstStyle/>
+          <a:p>
+            <a:pPr marL="0" lvl="0" indent="0" algn="ctr" rtl="0">
+              <a:spcBef>
+                <a:spcPts val="0"/>
+              </a:spcBef>
+              <a:spcAft>
+                <a:spcPts val="0"/>
+              </a:spcAft>
+              <a:buNone/>
+            </a:pPr>
+            <a:r>
+              <a:rPr lang="en-US" sz="4600" dirty="0"/>
+              <a:t>Actionable and Goal-Driven Project Scope</a:t>
+            </a:r>
+            <a:endParaRPr sz="4600" dirty="0"/>
+          </a:p>
+        </p:txBody>
+      </p:sp>
+      <p:pic>
+        <p:nvPicPr>
+          <p:cNvPr id="102" name="Google Shape;102;p5"/>
+          <p:cNvPicPr preferRelativeResize="0"/>
+          <p:nvPr/>
+        </p:nvPicPr>
+        <p:blipFill rotWithShape="1">
+          <a:blip r:embed="rId3">
+            <a:alphaModFix/>
+          </a:blip>
+          <a:srcRect/>
+          <a:stretch/>
+        </p:blipFill>
+        <p:spPr>
+          <a:xfrm>
+            <a:off x="8906232" y="1993197"/>
+            <a:ext cx="3068139" cy="3068139"/>
+          </a:xfrm>
+          <a:prstGeom prst="rect">
+            <a:avLst/>
+          </a:prstGeom>
+          <a:noFill/>
+          <a:ln>
+            <a:noFill/>
+          </a:ln>
+        </p:spPr>
+      </p:pic>
+    </p:spTree>
+    <p:extLst>
+      <p:ext uri="{BB962C8B-B14F-4D97-AF65-F5344CB8AC3E}">
+        <p14:creationId xmlns:p14="http://schemas.microsoft.com/office/powerpoint/2010/main" val="2436022473"/>
+      </p:ext>
+    </p:extLst>
+  </p:cSld>
+  <p:clrMapOvr>
+    <a:masterClrMapping/>
+  </p:clrMapOvr>
+</p:sld>
+</file>
+
+<file path=ppt/slides/slide47.xml><?xml version="1.0" encoding="utf-8"?>
+<p:sld xmlns:a="http://schemas.openxmlformats.org/drawingml/2006/main" xmlns:r="http://schemas.openxmlformats.org/officeDocument/2006/relationships" xmlns:p="http://schemas.openxmlformats.org/presentationml/2006/main" show="0">
+  <p:cSld>
+    <p:spTree>
+      <p:nvGrpSpPr>
+        <p:cNvPr id="1" name="Shape 93"/>
+        <p:cNvGrpSpPr/>
+        <p:nvPr/>
+      </p:nvGrpSpPr>
+      <p:grpSpPr>
+        <a:xfrm>
+          <a:off x="0" y="0"/>
+          <a:ext cx="0" cy="0"/>
+          <a:chOff x="0" y="0"/>
+          <a:chExt cx="0" cy="0"/>
+        </a:xfrm>
+      </p:grpSpPr>
+      <p:sp>
+        <p:nvSpPr>
+          <p:cNvPr id="94" name="Google Shape;94;p5"/>
+          <p:cNvSpPr txBox="1"/>
+          <p:nvPr/>
+        </p:nvSpPr>
+        <p:spPr>
+          <a:xfrm>
+            <a:off x="1981200" y="5624513"/>
+            <a:ext cx="2133600" cy="273900"/>
+          </a:xfrm>
+          <a:prstGeom prst="rect">
+            <a:avLst/>
+          </a:prstGeom>
+          <a:noFill/>
+          <a:ln>
+            <a:noFill/>
+          </a:ln>
+        </p:spPr>
+        <p:txBody>
+          <a:bodyPr spcFirstLastPara="1" wrap="square" lIns="91425" tIns="91425" rIns="91425" bIns="91425" anchor="ctr" anchorCtr="0">
+            <a:noAutofit/>
+          </a:bodyPr>
+          <a:lstStyle/>
+          <a:p>
+            <a:pPr marL="0" marR="0" lvl="0" indent="0" algn="l" rtl="0">
+              <a:spcBef>
+                <a:spcPts val="0"/>
+              </a:spcBef>
+              <a:spcAft>
+                <a:spcPts val="0"/>
+              </a:spcAft>
+              <a:buNone/>
+            </a:pPr>
+            <a:endParaRPr sz="2400" b="0" i="0" u="none" strike="noStrike" cap="none">
+              <a:solidFill>
+                <a:srgbClr val="000000"/>
+              </a:solidFill>
+              <a:latin typeface="Calibri"/>
+              <a:ea typeface="Calibri"/>
+              <a:cs typeface="Calibri"/>
+              <a:sym typeface="Calibri"/>
+            </a:endParaRPr>
+          </a:p>
+        </p:txBody>
+      </p:sp>
+      <p:sp>
+        <p:nvSpPr>
+          <p:cNvPr id="95" name="Google Shape;95;p5"/>
+          <p:cNvSpPr txBox="1"/>
+          <p:nvPr/>
+        </p:nvSpPr>
+        <p:spPr>
+          <a:xfrm>
+            <a:off x="4648200" y="5624513"/>
+            <a:ext cx="2895600" cy="273900"/>
+          </a:xfrm>
+          <a:prstGeom prst="rect">
+            <a:avLst/>
+          </a:prstGeom>
+          <a:noFill/>
+          <a:ln>
+            <a:noFill/>
+          </a:ln>
+        </p:spPr>
+        <p:txBody>
+          <a:bodyPr spcFirstLastPara="1" wrap="square" lIns="91425" tIns="91425" rIns="91425" bIns="91425" anchor="ctr" anchorCtr="0">
+            <a:noAutofit/>
+          </a:bodyPr>
+          <a:lstStyle/>
+          <a:p>
+            <a:pPr marL="0" marR="0" lvl="0" indent="0" algn="ctr" rtl="0">
+              <a:spcBef>
+                <a:spcPts val="0"/>
+              </a:spcBef>
+              <a:spcAft>
+                <a:spcPts val="0"/>
+              </a:spcAft>
+              <a:buNone/>
+            </a:pPr>
+            <a:endParaRPr sz="2400" b="0" i="0" u="none" strike="noStrike" cap="none">
+              <a:solidFill>
+                <a:srgbClr val="000000"/>
+              </a:solidFill>
+              <a:latin typeface="Calibri"/>
+              <a:ea typeface="Calibri"/>
+              <a:cs typeface="Calibri"/>
+              <a:sym typeface="Calibri"/>
+            </a:endParaRPr>
+          </a:p>
+        </p:txBody>
+      </p:sp>
+      <p:sp>
+        <p:nvSpPr>
+          <p:cNvPr id="96" name="Google Shape;96;p5"/>
+          <p:cNvSpPr txBox="1"/>
+          <p:nvPr/>
+        </p:nvSpPr>
+        <p:spPr>
+          <a:xfrm>
+            <a:off x="8077200" y="5624513"/>
+            <a:ext cx="2133600" cy="273900"/>
+          </a:xfrm>
+          <a:prstGeom prst="rect">
+            <a:avLst/>
+          </a:prstGeom>
+          <a:noFill/>
+          <a:ln>
+            <a:noFill/>
+          </a:ln>
+        </p:spPr>
+        <p:txBody>
+          <a:bodyPr spcFirstLastPara="1" wrap="square" lIns="91425" tIns="45700" rIns="91425" bIns="45700" anchor="ctr" anchorCtr="0">
+            <a:noAutofit/>
+          </a:bodyPr>
+          <a:lstStyle/>
+          <a:p>
+            <a:pPr marL="0" marR="0" lvl="0" indent="0" algn="r" rtl="0">
+              <a:spcBef>
+                <a:spcPts val="0"/>
+              </a:spcBef>
+              <a:spcAft>
+                <a:spcPts val="0"/>
+              </a:spcAft>
+              <a:buNone/>
+            </a:pPr>
+            <a:fld id="{00000000-1234-1234-1234-123412341234}" type="slidenum">
+              <a:rPr lang="en-US" sz="1200" b="0" i="0" u="none" strike="noStrike" cap="none">
+                <a:solidFill>
+                  <a:srgbClr val="888888"/>
+                </a:solidFill>
+                <a:latin typeface="Calibri"/>
+                <a:ea typeface="Calibri"/>
+                <a:cs typeface="Calibri"/>
+                <a:sym typeface="Calibri"/>
+              </a:rPr>
+              <a:t>47</a:t>
+            </a:fld>
+            <a:endParaRPr sz="1200" b="0" i="0" u="none" strike="noStrike" cap="none">
+              <a:solidFill>
+                <a:srgbClr val="888888"/>
+              </a:solidFill>
+              <a:latin typeface="Calibri"/>
+              <a:ea typeface="Calibri"/>
+              <a:cs typeface="Calibri"/>
+              <a:sym typeface="Calibri"/>
+            </a:endParaRPr>
+          </a:p>
+        </p:txBody>
+      </p:sp>
+      <p:sp>
+        <p:nvSpPr>
+          <p:cNvPr id="97" name="Google Shape;97;p5"/>
+          <p:cNvSpPr txBox="1"/>
+          <p:nvPr/>
+        </p:nvSpPr>
+        <p:spPr>
+          <a:xfrm>
+            <a:off x="1526024" y="5700726"/>
+            <a:ext cx="9144000" cy="273900"/>
+          </a:xfrm>
+          <a:prstGeom prst="rect">
+            <a:avLst/>
+          </a:prstGeom>
+          <a:noFill/>
+          <a:ln>
+            <a:noFill/>
+          </a:ln>
+        </p:spPr>
+        <p:txBody>
+          <a:bodyPr spcFirstLastPara="1" wrap="square" lIns="91425" tIns="45700" rIns="91425" bIns="45700" anchor="ctr" anchorCtr="0">
+            <a:noAutofit/>
+          </a:bodyPr>
+          <a:lstStyle/>
+          <a:p>
+            <a:pPr marL="0" marR="0" lvl="0" indent="0" algn="ctr" rtl="0">
+              <a:spcBef>
+                <a:spcPts val="0"/>
+              </a:spcBef>
+              <a:spcAft>
+                <a:spcPts val="0"/>
+              </a:spcAft>
+              <a:buNone/>
+            </a:pPr>
+            <a:r>
+              <a:rPr lang="en-US" sz="1200" b="0" i="0" u="none" strike="noStrike" cap="none">
+                <a:solidFill>
+                  <a:srgbClr val="FFFFFF"/>
+                </a:solidFill>
+                <a:latin typeface="Calibri"/>
+                <a:ea typeface="Calibri"/>
+                <a:cs typeface="Calibri"/>
+                <a:sym typeface="Calibri"/>
+              </a:rPr>
+              <a:t>Center for Data Science and Public Policy</a:t>
+            </a:r>
+            <a:br>
+              <a:rPr lang="en-US" sz="1200" b="0" i="0" u="none" strike="noStrike" cap="none">
+                <a:solidFill>
+                  <a:srgbClr val="FFFFFF"/>
+                </a:solidFill>
+                <a:latin typeface="Calibri"/>
+                <a:ea typeface="Calibri"/>
+                <a:cs typeface="Calibri"/>
+                <a:sym typeface="Calibri"/>
+              </a:rPr>
+            </a:br>
+            <a:r>
+              <a:rPr lang="en-US" sz="1200" b="0" i="0" u="none" strike="noStrike" cap="none">
+                <a:solidFill>
+                  <a:srgbClr val="FFFFFF"/>
+                </a:solidFill>
+                <a:latin typeface="Calibri"/>
+                <a:ea typeface="Calibri"/>
+                <a:cs typeface="Calibri"/>
+                <a:sym typeface="Calibri"/>
+              </a:rPr>
+              <a:t>University of Chicago</a:t>
+            </a:r>
+            <a:endParaRPr/>
+          </a:p>
+          <a:p>
+            <a:pPr marL="0" marR="0" lvl="0" indent="0" algn="ctr" rtl="0">
+              <a:spcBef>
+                <a:spcPts val="0"/>
+              </a:spcBef>
+              <a:spcAft>
+                <a:spcPts val="0"/>
+              </a:spcAft>
+              <a:buNone/>
+            </a:pPr>
+            <a:endParaRPr sz="1200" b="0" i="0" u="none" strike="noStrike" cap="none">
+              <a:solidFill>
+                <a:srgbClr val="FFFFFF"/>
+              </a:solidFill>
+              <a:latin typeface="Calibri"/>
+              <a:ea typeface="Calibri"/>
+              <a:cs typeface="Calibri"/>
+              <a:sym typeface="Calibri"/>
+            </a:endParaRPr>
+          </a:p>
+        </p:txBody>
+      </p:sp>
+      <p:sp>
+        <p:nvSpPr>
+          <p:cNvPr id="98" name="Google Shape;98;p5"/>
+          <p:cNvSpPr txBox="1"/>
+          <p:nvPr/>
+        </p:nvSpPr>
+        <p:spPr>
+          <a:xfrm>
+            <a:off x="1739600" y="5624526"/>
+            <a:ext cx="1592400" cy="273900"/>
+          </a:xfrm>
+          <a:prstGeom prst="rect">
+            <a:avLst/>
+          </a:prstGeom>
+          <a:noFill/>
+          <a:ln>
+            <a:noFill/>
+          </a:ln>
+        </p:spPr>
+        <p:txBody>
+          <a:bodyPr spcFirstLastPara="1" wrap="square" lIns="91425" tIns="45700" rIns="91425" bIns="45700" anchor="ctr" anchorCtr="0">
+            <a:noAutofit/>
+          </a:bodyPr>
+          <a:lstStyle/>
+          <a:p>
+            <a:pPr marL="0" marR="0" lvl="0" indent="0" algn="l" rtl="0">
+              <a:spcBef>
+                <a:spcPts val="0"/>
+              </a:spcBef>
+              <a:spcAft>
+                <a:spcPts val="0"/>
+              </a:spcAft>
+              <a:buNone/>
+            </a:pPr>
+            <a:r>
+              <a:rPr lang="en-US" sz="1200" b="0" i="0" u="none" strike="noStrike" cap="none">
+                <a:solidFill>
+                  <a:srgbClr val="FFFFFF"/>
+                </a:solidFill>
+                <a:latin typeface="Calibri"/>
+                <a:ea typeface="Calibri"/>
+                <a:cs typeface="Calibri"/>
+                <a:sym typeface="Calibri"/>
+              </a:rPr>
+              <a:t>dsapp.uchicago.edu</a:t>
+            </a:r>
+            <a:endParaRPr/>
+          </a:p>
+        </p:txBody>
+      </p:sp>
+      <p:sp>
+        <p:nvSpPr>
+          <p:cNvPr id="99" name="Google Shape;99;p5"/>
+          <p:cNvSpPr txBox="1"/>
+          <p:nvPr/>
+        </p:nvSpPr>
+        <p:spPr>
+          <a:xfrm>
+            <a:off x="8906233" y="5624513"/>
+            <a:ext cx="1304700" cy="273900"/>
+          </a:xfrm>
+          <a:prstGeom prst="rect">
+            <a:avLst/>
+          </a:prstGeom>
+          <a:noFill/>
+          <a:ln>
+            <a:noFill/>
+          </a:ln>
+        </p:spPr>
+        <p:txBody>
+          <a:bodyPr spcFirstLastPara="1" wrap="square" lIns="91425" tIns="45700" rIns="91425" bIns="45700" anchor="ctr" anchorCtr="0">
+            <a:noAutofit/>
+          </a:bodyPr>
+          <a:lstStyle/>
+          <a:p>
+            <a:pPr marL="0" marR="0" lvl="0" indent="0" algn="r" rtl="0">
+              <a:spcBef>
+                <a:spcPts val="0"/>
+              </a:spcBef>
+              <a:spcAft>
+                <a:spcPts val="0"/>
+              </a:spcAft>
+              <a:buNone/>
+            </a:pPr>
+            <a:r>
+              <a:rPr lang="en-US" sz="1200" b="0" i="0" u="none" strike="noStrike" cap="none">
+                <a:solidFill>
+                  <a:srgbClr val="FFFFFF"/>
+                </a:solidFill>
+                <a:latin typeface="Calibri"/>
+                <a:ea typeface="Calibri"/>
+                <a:cs typeface="Calibri"/>
+                <a:sym typeface="Calibri"/>
+              </a:rPr>
+              <a:t>@datascifellows</a:t>
+            </a:r>
+            <a:endParaRPr/>
+          </a:p>
+        </p:txBody>
+      </p:sp>
+      <p:sp>
+        <p:nvSpPr>
           <p:cNvPr id="101" name="Google Shape;101;p5"/>
           <p:cNvSpPr txBox="1">
             <a:spLocks noGrp="1"/>
@@ -29647,7 +29779,7 @@
 </p:sld>
 </file>
 
-<file path=ppt/slides/slide47.xml><?xml version="1.0" encoding="utf-8"?>
+<file path=ppt/slides/slide48.xml><?xml version="1.0" encoding="utf-8"?>
 <p:sld xmlns:a="http://schemas.openxmlformats.org/drawingml/2006/main" xmlns:r="http://schemas.openxmlformats.org/officeDocument/2006/relationships" xmlns:p="http://schemas.openxmlformats.org/presentationml/2006/main" show="0">
   <p:cSld>
     <p:spTree>
@@ -29770,7 +29902,7 @@
 </p:sld>
 </file>
 
-<file path=ppt/slides/slide48.xml><?xml version="1.0" encoding="utf-8"?>
+<file path=ppt/slides/slide49.xml><?xml version="1.0" encoding="utf-8"?>
 <p:sld xmlns:a="http://schemas.openxmlformats.org/drawingml/2006/main" xmlns:r="http://schemas.openxmlformats.org/officeDocument/2006/relationships" xmlns:p="http://schemas.openxmlformats.org/presentationml/2006/main" show="0">
   <p:cSld>
     <p:spTree>
@@ -29895,121 +30027,8 @@
 </p:sld>
 </file>
 
-<file path=ppt/slides/slide49.xml><?xml version="1.0" encoding="utf-8"?>
+<file path=ppt/slides/slide5.xml><?xml version="1.0" encoding="utf-8"?>
 <p:sld xmlns:a="http://schemas.openxmlformats.org/drawingml/2006/main" xmlns:r="http://schemas.openxmlformats.org/officeDocument/2006/relationships" xmlns:p="http://schemas.openxmlformats.org/presentationml/2006/main" show="0">
-  <p:cSld>
-    <p:spTree>
-      <p:nvGrpSpPr>
-        <p:cNvPr id="1" name=""/>
-        <p:cNvGrpSpPr/>
-        <p:nvPr/>
-      </p:nvGrpSpPr>
-      <p:grpSpPr>
-        <a:xfrm>
-          <a:off x="0" y="0"/>
-          <a:ext cx="0" cy="0"/>
-          <a:chOff x="0" y="0"/>
-          <a:chExt cx="0" cy="0"/>
-        </a:xfrm>
-      </p:grpSpPr>
-      <p:sp>
-        <p:nvSpPr>
-          <p:cNvPr id="2" name="Title 1">
-            <a:extLst>
-              <a:ext uri="{FF2B5EF4-FFF2-40B4-BE49-F238E27FC236}">
-                <a16:creationId xmlns:a16="http://schemas.microsoft.com/office/drawing/2014/main" id="{D5568ADA-C1EF-2741-BD8A-A472FF070613}"/>
-              </a:ext>
-            </a:extLst>
-          </p:cNvPr>
-          <p:cNvSpPr>
-            <a:spLocks noGrp="1"/>
-          </p:cNvSpPr>
-          <p:nvPr>
-            <p:ph type="title"/>
-          </p:nvPr>
-        </p:nvSpPr>
-        <p:spPr/>
-        <p:txBody>
-          <a:bodyPr/>
-          <a:lstStyle/>
-          <a:p>
-            <a:r>
-              <a:rPr lang="en-US" dirty="0"/>
-              <a:t>Missing Value Tips</a:t>
-            </a:r>
-          </a:p>
-        </p:txBody>
-      </p:sp>
-      <p:sp>
-        <p:nvSpPr>
-          <p:cNvPr id="3" name="Text Placeholder 2">
-            <a:extLst>
-              <a:ext uri="{FF2B5EF4-FFF2-40B4-BE49-F238E27FC236}">
-                <a16:creationId xmlns:a16="http://schemas.microsoft.com/office/drawing/2014/main" id="{D88AE774-4907-F841-8BD3-E9ECDB6BD8E8}"/>
-              </a:ext>
-            </a:extLst>
-          </p:cNvPr>
-          <p:cNvSpPr>
-            <a:spLocks noGrp="1"/>
-          </p:cNvSpPr>
-          <p:nvPr>
-            <p:ph type="body" idx="1"/>
-          </p:nvPr>
-        </p:nvSpPr>
-        <p:spPr/>
-        <p:txBody>
-          <a:bodyPr/>
-          <a:lstStyle/>
-          <a:p>
-            <a:r>
-              <a:rPr lang="en-US" dirty="0"/>
-              <a:t>Do not remove rows or columns with missing values (unless there is a really really really good reason)</a:t>
-            </a:r>
-          </a:p>
-          <a:p>
-            <a:endParaRPr lang="en-US" dirty="0"/>
-          </a:p>
-          <a:p>
-            <a:r>
-              <a:rPr lang="en-US" dirty="0"/>
-              <a:t>Missingness can be a useful predictor: create a flag even if you impute a value</a:t>
-            </a:r>
-          </a:p>
-          <a:p>
-            <a:endParaRPr lang="en-US" dirty="0"/>
-          </a:p>
-          <a:p>
-            <a:r>
-              <a:rPr lang="en-US" dirty="0"/>
-              <a:t>Data can be missing for different reasons and missingness for each row/column/cell may need to be handled differently</a:t>
-            </a:r>
-          </a:p>
-          <a:p>
-            <a:endParaRPr lang="en-US" dirty="0"/>
-          </a:p>
-          <a:p>
-            <a:r>
-              <a:rPr lang="en-US" dirty="0"/>
-              <a:t>Only use data from the past for imputation</a:t>
-            </a:r>
-          </a:p>
-        </p:txBody>
-      </p:sp>
-    </p:spTree>
-    <p:extLst>
-      <p:ext uri="{BB962C8B-B14F-4D97-AF65-F5344CB8AC3E}">
-        <p14:creationId xmlns:p14="http://schemas.microsoft.com/office/powerpoint/2010/main" val="2222239611"/>
-      </p:ext>
-    </p:extLst>
-  </p:cSld>
-  <p:clrMapOvr>
-    <a:masterClrMapping/>
-  </p:clrMapOvr>
-</p:sld>
-</file>
-
-<file path=ppt/slides/slide5.xml><?xml version="1.0" encoding="utf-8"?>
-<p:sld xmlns:a="http://schemas.openxmlformats.org/drawingml/2006/main" xmlns:r="http://schemas.openxmlformats.org/officeDocument/2006/relationships" xmlns:p="http://schemas.openxmlformats.org/presentationml/2006/main">
   <p:cSld>
     <p:spTree>
       <p:nvGrpSpPr>
@@ -30156,6 +30175,119 @@
       </p:grpSpPr>
       <p:sp>
         <p:nvSpPr>
+          <p:cNvPr id="2" name="Title 1">
+            <a:extLst>
+              <a:ext uri="{FF2B5EF4-FFF2-40B4-BE49-F238E27FC236}">
+                <a16:creationId xmlns:a16="http://schemas.microsoft.com/office/drawing/2014/main" id="{D5568ADA-C1EF-2741-BD8A-A472FF070613}"/>
+              </a:ext>
+            </a:extLst>
+          </p:cNvPr>
+          <p:cNvSpPr>
+            <a:spLocks noGrp="1"/>
+          </p:cNvSpPr>
+          <p:nvPr>
+            <p:ph type="title"/>
+          </p:nvPr>
+        </p:nvSpPr>
+        <p:spPr/>
+        <p:txBody>
+          <a:bodyPr/>
+          <a:lstStyle/>
+          <a:p>
+            <a:r>
+              <a:rPr lang="en-US" dirty="0"/>
+              <a:t>Missing Value Tips</a:t>
+            </a:r>
+          </a:p>
+        </p:txBody>
+      </p:sp>
+      <p:sp>
+        <p:nvSpPr>
+          <p:cNvPr id="3" name="Text Placeholder 2">
+            <a:extLst>
+              <a:ext uri="{FF2B5EF4-FFF2-40B4-BE49-F238E27FC236}">
+                <a16:creationId xmlns:a16="http://schemas.microsoft.com/office/drawing/2014/main" id="{D88AE774-4907-F841-8BD3-E9ECDB6BD8E8}"/>
+              </a:ext>
+            </a:extLst>
+          </p:cNvPr>
+          <p:cNvSpPr>
+            <a:spLocks noGrp="1"/>
+          </p:cNvSpPr>
+          <p:nvPr>
+            <p:ph type="body" idx="1"/>
+          </p:nvPr>
+        </p:nvSpPr>
+        <p:spPr/>
+        <p:txBody>
+          <a:bodyPr/>
+          <a:lstStyle/>
+          <a:p>
+            <a:r>
+              <a:rPr lang="en-US" dirty="0"/>
+              <a:t>Do not remove rows or columns with missing values (unless there is a really really really good reason)</a:t>
+            </a:r>
+          </a:p>
+          <a:p>
+            <a:endParaRPr lang="en-US" dirty="0"/>
+          </a:p>
+          <a:p>
+            <a:r>
+              <a:rPr lang="en-US" dirty="0"/>
+              <a:t>Missingness can be a useful predictor: create a flag even if you impute a value</a:t>
+            </a:r>
+          </a:p>
+          <a:p>
+            <a:endParaRPr lang="en-US" dirty="0"/>
+          </a:p>
+          <a:p>
+            <a:r>
+              <a:rPr lang="en-US" dirty="0"/>
+              <a:t>Data can be missing for different reasons and missingness for each row/column/cell may need to be handled differently</a:t>
+            </a:r>
+          </a:p>
+          <a:p>
+            <a:endParaRPr lang="en-US" dirty="0"/>
+          </a:p>
+          <a:p>
+            <a:r>
+              <a:rPr lang="en-US" dirty="0"/>
+              <a:t>Only use data from the past for imputation</a:t>
+            </a:r>
+          </a:p>
+        </p:txBody>
+      </p:sp>
+    </p:spTree>
+    <p:extLst>
+      <p:ext uri="{BB962C8B-B14F-4D97-AF65-F5344CB8AC3E}">
+        <p14:creationId xmlns:p14="http://schemas.microsoft.com/office/powerpoint/2010/main" val="2222239611"/>
+      </p:ext>
+    </p:extLst>
+  </p:cSld>
+  <p:clrMapOvr>
+    <a:masterClrMapping/>
+  </p:clrMapOvr>
+</p:sld>
+</file>
+
+<file path=ppt/slides/slide51.xml><?xml version="1.0" encoding="utf-8"?>
+<p:sld xmlns:a="http://schemas.openxmlformats.org/drawingml/2006/main" xmlns:r="http://schemas.openxmlformats.org/officeDocument/2006/relationships" xmlns:p="http://schemas.openxmlformats.org/presentationml/2006/main" show="0">
+  <p:cSld>
+    <p:spTree>
+      <p:nvGrpSpPr>
+        <p:cNvPr id="1" name=""/>
+        <p:cNvGrpSpPr/>
+        <p:nvPr/>
+      </p:nvGrpSpPr>
+      <p:grpSpPr>
+        <a:xfrm>
+          <a:off x="0" y="0"/>
+          <a:ext cx="0" cy="0"/>
+          <a:chOff x="0" y="0"/>
+          <a:chExt cx="0" cy="0"/>
+        </a:xfrm>
+      </p:grpSpPr>
+      <p:sp>
+        <p:nvSpPr>
           <p:cNvPr id="3" name="Title 2">
             <a:extLst>
               <a:ext uri="{FF2B5EF4-FFF2-40B4-BE49-F238E27FC236}">
@@ -30341,7 +30473,7 @@
 </p:sld>
 </file>
 
-<file path=ppt/slides/slide51.xml><?xml version="1.0" encoding="utf-8"?>
+<file path=ppt/slides/slide52.xml><?xml version="1.0" encoding="utf-8"?>
 <p:sld xmlns:a="http://schemas.openxmlformats.org/drawingml/2006/main" xmlns:r="http://schemas.openxmlformats.org/officeDocument/2006/relationships" xmlns:p="http://schemas.openxmlformats.org/presentationml/2006/main" show="0">
   <p:cSld>
     <p:spTree>
@@ -30932,7 +31064,7 @@
 </p:sld>
 </file>
 
-<file path=ppt/slides/slide52.xml><?xml version="1.0" encoding="utf-8"?>
+<file path=ppt/slides/slide53.xml><?xml version="1.0" encoding="utf-8"?>
 <p:sld xmlns:a="http://schemas.openxmlformats.org/drawingml/2006/main" xmlns:r="http://schemas.openxmlformats.org/officeDocument/2006/relationships" xmlns:p="http://schemas.openxmlformats.org/presentationml/2006/main" show="0">
   <p:cSld>
     <p:spTree>
@@ -31095,7 +31227,7 @@
 </p:sld>
 </file>
 
-<file path=ppt/slides/slide53.xml><?xml version="1.0" encoding="utf-8"?>
+<file path=ppt/slides/slide54.xml><?xml version="1.0" encoding="utf-8"?>
 <p:sld xmlns:a="http://schemas.openxmlformats.org/drawingml/2006/main" xmlns:r="http://schemas.openxmlformats.org/officeDocument/2006/relationships" xmlns:p="http://schemas.openxmlformats.org/presentationml/2006/main" show="0">
   <p:cSld>
     <p:spTree>
@@ -32508,7 +32640,7 @@
 </p:sld>
 </file>
 
-<file path=ppt/slides/slide54.xml><?xml version="1.0" encoding="utf-8"?>
+<file path=ppt/slides/slide55.xml><?xml version="1.0" encoding="utf-8"?>
 <p:sld xmlns:a="http://schemas.openxmlformats.org/drawingml/2006/main" xmlns:r="http://schemas.openxmlformats.org/officeDocument/2006/relationships" xmlns:p="http://schemas.openxmlformats.org/presentationml/2006/main" show="0">
   <p:cSld>
     <p:spTree>
@@ -33329,7 +33461,7 @@
 </p:sld>
 </file>
 
-<file path=ppt/slides/slide55.xml><?xml version="1.0" encoding="utf-8"?>
+<file path=ppt/slides/slide56.xml><?xml version="1.0" encoding="utf-8"?>
 <p:sld xmlns:a="http://schemas.openxmlformats.org/drawingml/2006/main" xmlns:r="http://schemas.openxmlformats.org/officeDocument/2006/relationships" xmlns:p="http://schemas.openxmlformats.org/presentationml/2006/main" show="0">
   <p:cSld>
     <p:spTree>
@@ -33418,7 +33550,7 @@
 </p:sld>
 </file>
 
-<file path=ppt/slides/slide56.xml><?xml version="1.0" encoding="utf-8"?>
+<file path=ppt/slides/slide57.xml><?xml version="1.0" encoding="utf-8"?>
 <p:sld xmlns:a="http://schemas.openxmlformats.org/drawingml/2006/main" xmlns:r="http://schemas.openxmlformats.org/officeDocument/2006/relationships" xmlns:p="http://schemas.openxmlformats.org/presentationml/2006/main">
   <p:cSld>
     <p:spTree>
@@ -33517,6 +33649,129 @@
           <a:p>
             <a:r>
               <a:rPr lang="en-US" dirty="0"/>
+              <a:t>Monday: Update 7 (on Canvas): ML Results Over Time and Model Selection</a:t>
+            </a:r>
+          </a:p>
+          <a:p>
+            <a:r>
+              <a:rPr lang="en-US" dirty="0"/>
+              <a:t>Tuesday: Feedback Form</a:t>
+            </a:r>
+          </a:p>
+        </p:txBody>
+      </p:sp>
+    </p:spTree>
+    <p:extLst>
+      <p:ext uri="{BB962C8B-B14F-4D97-AF65-F5344CB8AC3E}">
+        <p14:creationId xmlns:p14="http://schemas.microsoft.com/office/powerpoint/2010/main" val="2255880997"/>
+      </p:ext>
+    </p:extLst>
+  </p:cSld>
+  <p:clrMapOvr>
+    <a:masterClrMapping/>
+  </p:clrMapOvr>
+</p:sld>
+</file>
+
+<file path=ppt/slides/slide58.xml><?xml version="1.0" encoding="utf-8"?>
+<p:sld xmlns:a="http://schemas.openxmlformats.org/drawingml/2006/main" xmlns:r="http://schemas.openxmlformats.org/officeDocument/2006/relationships" xmlns:p="http://schemas.openxmlformats.org/presentationml/2006/main" show="0">
+  <p:cSld>
+    <p:spTree>
+      <p:nvGrpSpPr>
+        <p:cNvPr id="1" name=""/>
+        <p:cNvGrpSpPr/>
+        <p:nvPr/>
+      </p:nvGrpSpPr>
+      <p:grpSpPr>
+        <a:xfrm>
+          <a:off x="0" y="0"/>
+          <a:ext cx="0" cy="0"/>
+          <a:chOff x="0" y="0"/>
+          <a:chExt cx="0" cy="0"/>
+        </a:xfrm>
+      </p:grpSpPr>
+      <p:sp>
+        <p:nvSpPr>
+          <p:cNvPr id="3" name="Title 2">
+            <a:extLst>
+              <a:ext uri="{FF2B5EF4-FFF2-40B4-BE49-F238E27FC236}">
+                <a16:creationId xmlns:a16="http://schemas.microsoft.com/office/drawing/2014/main" id="{9323871C-7CA8-1448-8FFC-1AE6E1838941}"/>
+              </a:ext>
+            </a:extLst>
+          </p:cNvPr>
+          <p:cNvSpPr>
+            <a:spLocks noGrp="1"/>
+          </p:cNvSpPr>
+          <p:nvPr>
+            <p:ph type="title"/>
+          </p:nvPr>
+        </p:nvSpPr>
+        <p:spPr/>
+        <p:txBody>
+          <a:bodyPr/>
+          <a:lstStyle/>
+          <a:p>
+            <a:r>
+              <a:rPr lang="en-US" dirty="0"/>
+              <a:t>Reminders</a:t>
+            </a:r>
+          </a:p>
+        </p:txBody>
+      </p:sp>
+      <p:sp>
+        <p:nvSpPr>
+          <p:cNvPr id="5" name="Text Placeholder 4">
+            <a:extLst>
+              <a:ext uri="{FF2B5EF4-FFF2-40B4-BE49-F238E27FC236}">
+                <a16:creationId xmlns:a16="http://schemas.microsoft.com/office/drawing/2014/main" id="{F4E0A5F0-1D89-954D-91FB-596CD9E690F2}"/>
+              </a:ext>
+            </a:extLst>
+          </p:cNvPr>
+          <p:cNvSpPr>
+            <a:spLocks noGrp="1"/>
+          </p:cNvSpPr>
+          <p:nvPr>
+            <p:ph type="body" idx="1"/>
+          </p:nvPr>
+        </p:nvSpPr>
+        <p:spPr/>
+        <p:txBody>
+          <a:bodyPr/>
+          <a:lstStyle/>
+          <a:p>
+            <a:pPr marL="76200" indent="0">
+              <a:buNone/>
+            </a:pPr>
+            <a:r>
+              <a:rPr lang="en-US" b="1" dirty="0"/>
+              <a:t>This week:</a:t>
+            </a:r>
+            <a:endParaRPr lang="en-US" dirty="0"/>
+          </a:p>
+          <a:p>
+            <a:r>
+              <a:rPr lang="en-US" dirty="0"/>
+              <a:t>Wednesday team check-ins</a:t>
+            </a:r>
+          </a:p>
+          <a:p>
+            <a:pPr marL="76200" indent="0">
+              <a:buNone/>
+            </a:pPr>
+            <a:endParaRPr lang="en-US" dirty="0"/>
+          </a:p>
+          <a:p>
+            <a:pPr marL="76200" indent="0">
+              <a:buNone/>
+            </a:pPr>
+            <a:r>
+              <a:rPr lang="en-US" b="1" dirty="0"/>
+              <a:t>Coming up next week:</a:t>
+            </a:r>
+          </a:p>
+          <a:p>
+            <a:r>
+              <a:rPr lang="en-US" dirty="0"/>
               <a:t>Monday: Update 4 (on Canvas): v0 ML Results and Planned Model Grid</a:t>
             </a:r>
           </a:p>
@@ -33552,7 +33807,7 @@
 </file>
 
 <file path=ppt/slides/slide6.xml><?xml version="1.0" encoding="utf-8"?>
-<p:sld xmlns:a="http://schemas.openxmlformats.org/drawingml/2006/main" xmlns:r="http://schemas.openxmlformats.org/officeDocument/2006/relationships" xmlns:p="http://schemas.openxmlformats.org/presentationml/2006/main">
+<p:sld xmlns:a="http://schemas.openxmlformats.org/drawingml/2006/main" xmlns:r="http://schemas.openxmlformats.org/officeDocument/2006/relationships" xmlns:p="http://schemas.openxmlformats.org/presentationml/2006/main" show="0">
   <p:cSld>
     <p:spTree>
       <p:nvGrpSpPr>
@@ -33895,7 +34150,7 @@
 </file>
 
 <file path=ppt/slides/slide7.xml><?xml version="1.0" encoding="utf-8"?>
-<p:sld xmlns:a="http://schemas.openxmlformats.org/drawingml/2006/main" xmlns:r="http://schemas.openxmlformats.org/officeDocument/2006/relationships" xmlns:p="http://schemas.openxmlformats.org/presentationml/2006/main">
+<p:sld xmlns:a="http://schemas.openxmlformats.org/drawingml/2006/main" xmlns:r="http://schemas.openxmlformats.org/officeDocument/2006/relationships" xmlns:p="http://schemas.openxmlformats.org/presentationml/2006/main" show="0">
   <p:cSld>
     <p:spTree>
       <p:nvGrpSpPr>
@@ -33978,7 +34233,7 @@
 </file>
 
 <file path=ppt/slides/slide8.xml><?xml version="1.0" encoding="utf-8"?>
-<p:sld xmlns:a="http://schemas.openxmlformats.org/drawingml/2006/main" xmlns:r="http://schemas.openxmlformats.org/officeDocument/2006/relationships" xmlns:p="http://schemas.openxmlformats.org/presentationml/2006/main">
+<p:sld xmlns:a="http://schemas.openxmlformats.org/drawingml/2006/main" xmlns:r="http://schemas.openxmlformats.org/officeDocument/2006/relationships" xmlns:p="http://schemas.openxmlformats.org/presentationml/2006/main" show="0">
   <p:cSld>
     <p:spTree>
       <p:nvGrpSpPr>
@@ -34061,7 +34316,7 @@
 </file>
 
 <file path=ppt/slides/slide9.xml><?xml version="1.0" encoding="utf-8"?>
-<p:sld xmlns:a="http://schemas.openxmlformats.org/drawingml/2006/main" xmlns:r="http://schemas.openxmlformats.org/officeDocument/2006/relationships" xmlns:p="http://schemas.openxmlformats.org/presentationml/2006/main">
+<p:sld xmlns:a="http://schemas.openxmlformats.org/drawingml/2006/main" xmlns:r="http://schemas.openxmlformats.org/officeDocument/2006/relationships" xmlns:p="http://schemas.openxmlformats.org/presentationml/2006/main" show="0">
   <p:cSld>
     <p:spTree>
       <p:nvGrpSpPr>

</xml_diff>